<commit_message>
Added Diagrams for UseCases
</commit_message>
<xml_diff>
--- a/Bachelor_Zwischenstand.pptx
+++ b/Bachelor_Zwischenstand.pptx
@@ -147,6 +147,3371 @@
 
 <file path=ppt/revisionInfo.xml><?xml version="1.0" encoding="utf-8"?>
 <p1510:revInfo xmlns:a="http://schemas.openxmlformats.org/drawingml/2006/main" xmlns:r="http://schemas.openxmlformats.org/officeDocument/2006/relationships" xmlns:p1510="http://schemas.microsoft.com/office/powerpoint/2015/10/main"/>
+</file>
+
+<file path=ppt/charts/chart1.xml><?xml version="1.0" encoding="utf-8"?>
+<c:chartSpace xmlns:c="http://schemas.openxmlformats.org/drawingml/2006/chart" xmlns:a="http://schemas.openxmlformats.org/drawingml/2006/main" xmlns:r="http://schemas.openxmlformats.org/officeDocument/2006/relationships" xmlns:c16r2="http://schemas.microsoft.com/office/drawing/2015/06/chart">
+  <c:date1904 val="0"/>
+  <c:lang val="de-DE"/>
+  <c:roundedCorners val="0"/>
+  <mc:AlternateContent xmlns:mc="http://schemas.openxmlformats.org/markup-compatibility/2006">
+    <mc:Choice xmlns:c14="http://schemas.microsoft.com/office/drawing/2007/8/2/chart" Requires="c14">
+      <c14:style val="102"/>
+    </mc:Choice>
+    <mc:Fallback>
+      <c:style val="2"/>
+    </mc:Fallback>
+  </mc:AlternateContent>
+  <c:chart>
+    <c:title>
+      <c:overlay val="0"/>
+      <c:spPr>
+        <a:noFill/>
+        <a:ln>
+          <a:noFill/>
+        </a:ln>
+        <a:effectLst/>
+      </c:spPr>
+      <c:txPr>
+        <a:bodyPr rot="0" spcFirstLastPara="1" vertOverflow="ellipsis" vert="horz" wrap="square" anchor="ctr" anchorCtr="1"/>
+        <a:lstStyle/>
+        <a:p>
+          <a:pPr>
+            <a:defRPr sz="1400" b="0" i="0" u="none" strike="noStrike" kern="1200" spc="0" baseline="0">
+              <a:solidFill>
+                <a:schemeClr val="tx1">
+                  <a:lumMod val="65000"/>
+                  <a:lumOff val="35000"/>
+                </a:schemeClr>
+              </a:solidFill>
+              <a:latin typeface="+mn-lt"/>
+              <a:ea typeface="+mn-ea"/>
+              <a:cs typeface="+mn-cs"/>
+            </a:defRPr>
+          </a:pPr>
+          <a:endParaRPr lang="de-DE"/>
+        </a:p>
+      </c:txPr>
+    </c:title>
+    <c:autoTitleDeleted val="0"/>
+    <c:plotArea>
+      <c:layout/>
+      <c:lineChart>
+        <c:grouping val="standard"/>
+        <c:varyColors val="0"/>
+        <c:ser>
+          <c:idx val="0"/>
+          <c:order val="0"/>
+          <c:tx>
+            <c:v>Accuracy</c:v>
+          </c:tx>
+          <c:spPr>
+            <a:ln w="28575" cap="rnd">
+              <a:solidFill>
+                <a:schemeClr val="tx2"/>
+              </a:solidFill>
+              <a:round/>
+            </a:ln>
+            <a:effectLst/>
+          </c:spPr>
+          <c:marker>
+            <c:symbol val="none"/>
+          </c:marker>
+          <c:cat>
+            <c:numRef>
+              <c:f>Rides!$A$3:$A$9</c:f>
+              <c:numCache>
+                <c:formatCode>0</c:formatCode>
+                <c:ptCount val="7"/>
+                <c:pt idx="0">
+                  <c:v>1</c:v>
+                </c:pt>
+                <c:pt idx="1">
+                  <c:v>5</c:v>
+                </c:pt>
+                <c:pt idx="2">
+                  <c:v>10</c:v>
+                </c:pt>
+                <c:pt idx="3">
+                  <c:v>50</c:v>
+                </c:pt>
+                <c:pt idx="4">
+                  <c:v>100</c:v>
+                </c:pt>
+                <c:pt idx="5">
+                  <c:v>500</c:v>
+                </c:pt>
+                <c:pt idx="6">
+                  <c:v>1000</c:v>
+                </c:pt>
+              </c:numCache>
+            </c:numRef>
+          </c:cat>
+          <c:val>
+            <c:numRef>
+              <c:f>Rides!$B$3:$B$9</c:f>
+              <c:numCache>
+                <c:formatCode>0.000</c:formatCode>
+                <c:ptCount val="7"/>
+                <c:pt idx="0">
+                  <c:v>0.1</c:v>
+                </c:pt>
+                <c:pt idx="1">
+                  <c:v>-1.49</c:v>
+                </c:pt>
+                <c:pt idx="2">
+                  <c:v>-0.3</c:v>
+                </c:pt>
+                <c:pt idx="3">
+                  <c:v>0.37</c:v>
+                </c:pt>
+                <c:pt idx="4">
+                  <c:v>0.5</c:v>
+                </c:pt>
+                <c:pt idx="5">
+                  <c:v>0.7</c:v>
+                </c:pt>
+                <c:pt idx="6">
+                  <c:v>0.73</c:v>
+                </c:pt>
+              </c:numCache>
+            </c:numRef>
+          </c:val>
+          <c:smooth val="0"/>
+          <c:extLst>
+            <c:ext xmlns:c16="http://schemas.microsoft.com/office/drawing/2014/chart" uri="{C3380CC4-5D6E-409C-BE32-E72D297353CC}">
+              <c16:uniqueId val="{00000000-D350-46D5-85C0-C6212EA174D1}"/>
+            </c:ext>
+          </c:extLst>
+        </c:ser>
+        <c:dLbls>
+          <c:showLegendKey val="0"/>
+          <c:showVal val="0"/>
+          <c:showCatName val="0"/>
+          <c:showSerName val="0"/>
+          <c:showPercent val="0"/>
+          <c:showBubbleSize val="0"/>
+        </c:dLbls>
+        <c:smooth val="0"/>
+        <c:axId val="459571648"/>
+        <c:axId val="459999248"/>
+      </c:lineChart>
+      <c:catAx>
+        <c:axId val="459571648"/>
+        <c:scaling>
+          <c:orientation val="minMax"/>
+        </c:scaling>
+        <c:delete val="0"/>
+        <c:axPos val="b"/>
+        <c:numFmt formatCode="0" sourceLinked="1"/>
+        <c:majorTickMark val="none"/>
+        <c:minorTickMark val="none"/>
+        <c:tickLblPos val="nextTo"/>
+        <c:spPr>
+          <a:noFill/>
+          <a:ln w="9525" cap="flat" cmpd="sng" algn="ctr">
+            <a:solidFill>
+              <a:schemeClr val="tx1">
+                <a:lumMod val="15000"/>
+                <a:lumOff val="85000"/>
+              </a:schemeClr>
+            </a:solidFill>
+            <a:round/>
+          </a:ln>
+          <a:effectLst/>
+        </c:spPr>
+        <c:txPr>
+          <a:bodyPr rot="-60000000" spcFirstLastPara="1" vertOverflow="ellipsis" vert="horz" wrap="square" anchor="ctr" anchorCtr="1"/>
+          <a:lstStyle/>
+          <a:p>
+            <a:pPr>
+              <a:defRPr sz="900" b="0" i="0" u="none" strike="noStrike" kern="1200" baseline="0">
+                <a:solidFill>
+                  <a:schemeClr val="tx1">
+                    <a:lumMod val="65000"/>
+                    <a:lumOff val="35000"/>
+                  </a:schemeClr>
+                </a:solidFill>
+                <a:latin typeface="+mn-lt"/>
+                <a:ea typeface="+mn-ea"/>
+                <a:cs typeface="+mn-cs"/>
+              </a:defRPr>
+            </a:pPr>
+            <a:endParaRPr lang="de-DE"/>
+          </a:p>
+        </c:txPr>
+        <c:crossAx val="459999248"/>
+        <c:crosses val="autoZero"/>
+        <c:auto val="1"/>
+        <c:lblAlgn val="ctr"/>
+        <c:lblOffset val="100"/>
+        <c:noMultiLvlLbl val="0"/>
+      </c:catAx>
+      <c:valAx>
+        <c:axId val="459999248"/>
+        <c:scaling>
+          <c:orientation val="minMax"/>
+        </c:scaling>
+        <c:delete val="0"/>
+        <c:axPos val="l"/>
+        <c:majorGridlines>
+          <c:spPr>
+            <a:ln w="9525" cap="flat" cmpd="sng" algn="ctr">
+              <a:solidFill>
+                <a:schemeClr val="tx1">
+                  <a:lumMod val="15000"/>
+                  <a:lumOff val="85000"/>
+                </a:schemeClr>
+              </a:solidFill>
+              <a:round/>
+            </a:ln>
+            <a:effectLst/>
+          </c:spPr>
+        </c:majorGridlines>
+        <c:numFmt formatCode="0.000" sourceLinked="1"/>
+        <c:majorTickMark val="none"/>
+        <c:minorTickMark val="none"/>
+        <c:tickLblPos val="nextTo"/>
+        <c:spPr>
+          <a:noFill/>
+          <a:ln>
+            <a:noFill/>
+          </a:ln>
+          <a:effectLst/>
+        </c:spPr>
+        <c:txPr>
+          <a:bodyPr rot="-60000000" spcFirstLastPara="1" vertOverflow="ellipsis" vert="horz" wrap="square" anchor="ctr" anchorCtr="1"/>
+          <a:lstStyle/>
+          <a:p>
+            <a:pPr>
+              <a:defRPr sz="900" b="0" i="0" u="none" strike="noStrike" kern="1200" baseline="0">
+                <a:solidFill>
+                  <a:schemeClr val="tx1">
+                    <a:lumMod val="65000"/>
+                    <a:lumOff val="35000"/>
+                  </a:schemeClr>
+                </a:solidFill>
+                <a:latin typeface="+mn-lt"/>
+                <a:ea typeface="+mn-ea"/>
+                <a:cs typeface="+mn-cs"/>
+              </a:defRPr>
+            </a:pPr>
+            <a:endParaRPr lang="de-DE"/>
+          </a:p>
+        </c:txPr>
+        <c:crossAx val="459571648"/>
+        <c:crosses val="autoZero"/>
+        <c:crossBetween val="between"/>
+      </c:valAx>
+      <c:spPr>
+        <a:noFill/>
+        <a:ln>
+          <a:noFill/>
+        </a:ln>
+        <a:effectLst/>
+      </c:spPr>
+    </c:plotArea>
+    <c:plotVisOnly val="1"/>
+    <c:dispBlanksAs val="gap"/>
+    <c:showDLblsOverMax val="0"/>
+  </c:chart>
+  <c:spPr>
+    <a:noFill/>
+    <a:ln>
+      <a:noFill/>
+    </a:ln>
+    <a:effectLst/>
+  </c:spPr>
+  <c:txPr>
+    <a:bodyPr/>
+    <a:lstStyle/>
+    <a:p>
+      <a:pPr>
+        <a:defRPr/>
+      </a:pPr>
+      <a:endParaRPr lang="de-DE"/>
+    </a:p>
+  </c:txPr>
+  <c:externalData r:id="rId3">
+    <c:autoUpdate val="0"/>
+  </c:externalData>
+</c:chartSpace>
+</file>
+
+<file path=ppt/charts/chart2.xml><?xml version="1.0" encoding="utf-8"?>
+<c:chartSpace xmlns:c="http://schemas.openxmlformats.org/drawingml/2006/chart" xmlns:a="http://schemas.openxmlformats.org/drawingml/2006/main" xmlns:r="http://schemas.openxmlformats.org/officeDocument/2006/relationships" xmlns:c16r2="http://schemas.microsoft.com/office/drawing/2015/06/chart">
+  <c:date1904 val="0"/>
+  <c:lang val="de-DE"/>
+  <c:roundedCorners val="0"/>
+  <mc:AlternateContent xmlns:mc="http://schemas.openxmlformats.org/markup-compatibility/2006">
+    <mc:Choice xmlns:c14="http://schemas.microsoft.com/office/drawing/2007/8/2/chart" Requires="c14">
+      <c14:style val="102"/>
+    </mc:Choice>
+    <mc:Fallback>
+      <c:style val="2"/>
+    </mc:Fallback>
+  </mc:AlternateContent>
+  <c:chart>
+    <c:title>
+      <c:overlay val="0"/>
+      <c:spPr>
+        <a:noFill/>
+        <a:ln>
+          <a:noFill/>
+        </a:ln>
+        <a:effectLst/>
+      </c:spPr>
+      <c:txPr>
+        <a:bodyPr rot="0" spcFirstLastPara="1" vertOverflow="ellipsis" vert="horz" wrap="square" anchor="ctr" anchorCtr="1"/>
+        <a:lstStyle/>
+        <a:p>
+          <a:pPr>
+            <a:defRPr sz="1400" b="0" i="0" u="none" strike="noStrike" kern="1200" spc="0" baseline="0">
+              <a:solidFill>
+                <a:schemeClr val="tx1">
+                  <a:lumMod val="65000"/>
+                  <a:lumOff val="35000"/>
+                </a:schemeClr>
+              </a:solidFill>
+              <a:latin typeface="+mn-lt"/>
+              <a:ea typeface="+mn-ea"/>
+              <a:cs typeface="+mn-cs"/>
+            </a:defRPr>
+          </a:pPr>
+          <a:endParaRPr lang="de-DE"/>
+        </a:p>
+      </c:txPr>
+    </c:title>
+    <c:autoTitleDeleted val="0"/>
+    <c:plotArea>
+      <c:layout>
+        <c:manualLayout>
+          <c:layoutTarget val="inner"/>
+          <c:xMode val="edge"/>
+          <c:yMode val="edge"/>
+          <c:x val="7.7225334095086695E-2"/>
+          <c:y val="7.1348940914158304E-2"/>
+          <c:w val="0.88580608202096478"/>
+          <c:h val="0.84749936358289657"/>
+        </c:manualLayout>
+      </c:layout>
+      <c:lineChart>
+        <c:grouping val="standard"/>
+        <c:varyColors val="0"/>
+        <c:ser>
+          <c:idx val="1"/>
+          <c:order val="0"/>
+          <c:tx>
+            <c:strRef>
+              <c:f>Tip!$B$2</c:f>
+              <c:strCache>
+                <c:ptCount val="1"/>
+                <c:pt idx="0">
+                  <c:v>Accuracy</c:v>
+                </c:pt>
+              </c:strCache>
+            </c:strRef>
+          </c:tx>
+          <c:spPr>
+            <a:ln w="28575" cap="rnd">
+              <a:solidFill>
+                <a:schemeClr val="tx2"/>
+              </a:solidFill>
+              <a:round/>
+            </a:ln>
+            <a:effectLst/>
+          </c:spPr>
+          <c:marker>
+            <c:symbol val="none"/>
+          </c:marker>
+          <c:cat>
+            <c:numRef>
+              <c:f>Tip!$A$3:$A$9</c:f>
+              <c:numCache>
+                <c:formatCode>0</c:formatCode>
+                <c:ptCount val="7"/>
+                <c:pt idx="0">
+                  <c:v>1</c:v>
+                </c:pt>
+                <c:pt idx="1">
+                  <c:v>5</c:v>
+                </c:pt>
+                <c:pt idx="2">
+                  <c:v>10</c:v>
+                </c:pt>
+                <c:pt idx="3">
+                  <c:v>50</c:v>
+                </c:pt>
+                <c:pt idx="4">
+                  <c:v>100</c:v>
+                </c:pt>
+                <c:pt idx="5">
+                  <c:v>500</c:v>
+                </c:pt>
+                <c:pt idx="6">
+                  <c:v>1000</c:v>
+                </c:pt>
+              </c:numCache>
+            </c:numRef>
+          </c:cat>
+          <c:val>
+            <c:numRef>
+              <c:f>Tip!$B$3:$B$9</c:f>
+              <c:numCache>
+                <c:formatCode>0.000</c:formatCode>
+                <c:ptCount val="7"/>
+                <c:pt idx="0">
+                  <c:v>0.38</c:v>
+                </c:pt>
+                <c:pt idx="1">
+                  <c:v>0.74</c:v>
+                </c:pt>
+                <c:pt idx="2">
+                  <c:v>0.78900000000000003</c:v>
+                </c:pt>
+                <c:pt idx="3">
+                  <c:v>0.83699999999999997</c:v>
+                </c:pt>
+                <c:pt idx="4">
+                  <c:v>0.85</c:v>
+                </c:pt>
+                <c:pt idx="5">
+                  <c:v>0.88</c:v>
+                </c:pt>
+                <c:pt idx="6">
+                  <c:v>0.89500000000000002</c:v>
+                </c:pt>
+              </c:numCache>
+            </c:numRef>
+          </c:val>
+          <c:smooth val="0"/>
+          <c:extLst>
+            <c:ext xmlns:c16="http://schemas.microsoft.com/office/drawing/2014/chart" uri="{C3380CC4-5D6E-409C-BE32-E72D297353CC}">
+              <c16:uniqueId val="{00000000-08B6-49F8-B6EF-BF28C3726E24}"/>
+            </c:ext>
+          </c:extLst>
+        </c:ser>
+        <c:dLbls>
+          <c:showLegendKey val="0"/>
+          <c:showVal val="0"/>
+          <c:showCatName val="0"/>
+          <c:showSerName val="0"/>
+          <c:showPercent val="0"/>
+          <c:showBubbleSize val="0"/>
+        </c:dLbls>
+        <c:smooth val="0"/>
+        <c:axId val="457214808"/>
+        <c:axId val="457215136"/>
+      </c:lineChart>
+      <c:catAx>
+        <c:axId val="457214808"/>
+        <c:scaling>
+          <c:orientation val="minMax"/>
+        </c:scaling>
+        <c:delete val="0"/>
+        <c:axPos val="b"/>
+        <c:numFmt formatCode="0" sourceLinked="1"/>
+        <c:majorTickMark val="none"/>
+        <c:minorTickMark val="none"/>
+        <c:tickLblPos val="nextTo"/>
+        <c:spPr>
+          <a:noFill/>
+          <a:ln w="9525" cap="flat" cmpd="sng" algn="ctr">
+            <a:solidFill>
+              <a:schemeClr val="tx1">
+                <a:lumMod val="15000"/>
+                <a:lumOff val="85000"/>
+              </a:schemeClr>
+            </a:solidFill>
+            <a:round/>
+          </a:ln>
+          <a:effectLst/>
+        </c:spPr>
+        <c:txPr>
+          <a:bodyPr rot="-60000000" spcFirstLastPara="1" vertOverflow="ellipsis" vert="horz" wrap="square" anchor="ctr" anchorCtr="1"/>
+          <a:lstStyle/>
+          <a:p>
+            <a:pPr>
+              <a:defRPr sz="900" b="0" i="0" u="none" strike="noStrike" kern="1200" baseline="0">
+                <a:solidFill>
+                  <a:schemeClr val="tx1">
+                    <a:lumMod val="65000"/>
+                    <a:lumOff val="35000"/>
+                  </a:schemeClr>
+                </a:solidFill>
+                <a:latin typeface="+mn-lt"/>
+                <a:ea typeface="+mn-ea"/>
+                <a:cs typeface="+mn-cs"/>
+              </a:defRPr>
+            </a:pPr>
+            <a:endParaRPr lang="de-DE"/>
+          </a:p>
+        </c:txPr>
+        <c:crossAx val="457215136"/>
+        <c:crosses val="autoZero"/>
+        <c:auto val="1"/>
+        <c:lblAlgn val="ctr"/>
+        <c:lblOffset val="100"/>
+        <c:noMultiLvlLbl val="0"/>
+      </c:catAx>
+      <c:valAx>
+        <c:axId val="457215136"/>
+        <c:scaling>
+          <c:orientation val="minMax"/>
+        </c:scaling>
+        <c:delete val="0"/>
+        <c:axPos val="l"/>
+        <c:majorGridlines>
+          <c:spPr>
+            <a:ln w="9525" cap="flat" cmpd="sng" algn="ctr">
+              <a:solidFill>
+                <a:schemeClr val="tx1">
+                  <a:lumMod val="15000"/>
+                  <a:lumOff val="85000"/>
+                </a:schemeClr>
+              </a:solidFill>
+              <a:round/>
+            </a:ln>
+            <a:effectLst/>
+          </c:spPr>
+        </c:majorGridlines>
+        <c:numFmt formatCode="0.000" sourceLinked="1"/>
+        <c:majorTickMark val="none"/>
+        <c:minorTickMark val="none"/>
+        <c:tickLblPos val="nextTo"/>
+        <c:spPr>
+          <a:noFill/>
+          <a:ln>
+            <a:noFill/>
+          </a:ln>
+          <a:effectLst/>
+        </c:spPr>
+        <c:txPr>
+          <a:bodyPr rot="-60000000" spcFirstLastPara="1" vertOverflow="ellipsis" vert="horz" wrap="square" anchor="ctr" anchorCtr="1"/>
+          <a:lstStyle/>
+          <a:p>
+            <a:pPr>
+              <a:defRPr sz="900" b="0" i="0" u="none" strike="noStrike" kern="1200" baseline="0">
+                <a:solidFill>
+                  <a:schemeClr val="tx1">
+                    <a:lumMod val="65000"/>
+                    <a:lumOff val="35000"/>
+                  </a:schemeClr>
+                </a:solidFill>
+                <a:latin typeface="+mn-lt"/>
+                <a:ea typeface="+mn-ea"/>
+                <a:cs typeface="+mn-cs"/>
+              </a:defRPr>
+            </a:pPr>
+            <a:endParaRPr lang="de-DE"/>
+          </a:p>
+        </c:txPr>
+        <c:crossAx val="457214808"/>
+        <c:crosses val="autoZero"/>
+        <c:crossBetween val="between"/>
+      </c:valAx>
+      <c:spPr>
+        <a:noFill/>
+        <a:ln>
+          <a:noFill/>
+        </a:ln>
+        <a:effectLst/>
+      </c:spPr>
+    </c:plotArea>
+    <c:plotVisOnly val="1"/>
+    <c:dispBlanksAs val="gap"/>
+    <c:showDLblsOverMax val="0"/>
+  </c:chart>
+  <c:spPr>
+    <a:noFill/>
+    <a:ln>
+      <a:noFill/>
+    </a:ln>
+    <a:effectLst/>
+  </c:spPr>
+  <c:txPr>
+    <a:bodyPr/>
+    <a:lstStyle/>
+    <a:p>
+      <a:pPr>
+        <a:defRPr/>
+      </a:pPr>
+      <a:endParaRPr lang="de-DE"/>
+    </a:p>
+  </c:txPr>
+  <c:externalData r:id="rId3">
+    <c:autoUpdate val="0"/>
+  </c:externalData>
+</c:chartSpace>
+</file>
+
+<file path=ppt/charts/chart3.xml><?xml version="1.0" encoding="utf-8"?>
+<c:chartSpace xmlns:c="http://schemas.openxmlformats.org/drawingml/2006/chart" xmlns:a="http://schemas.openxmlformats.org/drawingml/2006/main" xmlns:r="http://schemas.openxmlformats.org/officeDocument/2006/relationships" xmlns:c16r2="http://schemas.microsoft.com/office/drawing/2015/06/chart">
+  <c:date1904 val="0"/>
+  <c:lang val="de-DE"/>
+  <c:roundedCorners val="0"/>
+  <mc:AlternateContent xmlns:mc="http://schemas.openxmlformats.org/markup-compatibility/2006">
+    <mc:Choice xmlns:c14="http://schemas.microsoft.com/office/drawing/2007/8/2/chart" Requires="c14">
+      <c14:style val="102"/>
+    </mc:Choice>
+    <mc:Fallback>
+      <c:style val="2"/>
+    </mc:Fallback>
+  </mc:AlternateContent>
+  <c:chart>
+    <c:title>
+      <c:overlay val="0"/>
+      <c:spPr>
+        <a:noFill/>
+        <a:ln>
+          <a:noFill/>
+        </a:ln>
+        <a:effectLst/>
+      </c:spPr>
+      <c:txPr>
+        <a:bodyPr rot="0" spcFirstLastPara="1" vertOverflow="ellipsis" vert="horz" wrap="square" anchor="ctr" anchorCtr="1"/>
+        <a:lstStyle/>
+        <a:p>
+          <a:pPr>
+            <a:defRPr sz="1400" b="0" i="0" u="none" strike="noStrike" kern="1200" spc="0" baseline="0">
+              <a:solidFill>
+                <a:schemeClr val="tx1">
+                  <a:lumMod val="65000"/>
+                  <a:lumOff val="35000"/>
+                </a:schemeClr>
+              </a:solidFill>
+              <a:latin typeface="+mn-lt"/>
+              <a:ea typeface="+mn-ea"/>
+              <a:cs typeface="+mn-cs"/>
+            </a:defRPr>
+          </a:pPr>
+          <a:endParaRPr lang="de-DE"/>
+        </a:p>
+      </c:txPr>
+    </c:title>
+    <c:autoTitleDeleted val="0"/>
+    <c:plotArea>
+      <c:layout/>
+      <c:lineChart>
+        <c:grouping val="standard"/>
+        <c:varyColors val="0"/>
+        <c:ser>
+          <c:idx val="1"/>
+          <c:order val="0"/>
+          <c:tx>
+            <c:v>Accuracy</c:v>
+          </c:tx>
+          <c:spPr>
+            <a:ln w="28575" cap="rnd">
+              <a:solidFill>
+                <a:schemeClr val="tx2"/>
+              </a:solidFill>
+              <a:round/>
+            </a:ln>
+            <a:effectLst/>
+          </c:spPr>
+          <c:marker>
+            <c:symbol val="none"/>
+          </c:marker>
+          <c:val>
+            <c:numRef>
+              <c:f>RevenueAVG!$B$3:$B$9</c:f>
+              <c:numCache>
+                <c:formatCode>0.000</c:formatCode>
+                <c:ptCount val="7"/>
+                <c:pt idx="0">
+                  <c:v>0.01</c:v>
+                </c:pt>
+                <c:pt idx="1">
+                  <c:v>-7.0000000000000007E-2</c:v>
+                </c:pt>
+                <c:pt idx="2">
+                  <c:v>-0.2</c:v>
+                </c:pt>
+                <c:pt idx="3">
+                  <c:v>0</c:v>
+                </c:pt>
+                <c:pt idx="4">
+                  <c:v>0.18</c:v>
+                </c:pt>
+                <c:pt idx="5">
+                  <c:v>0.31</c:v>
+                </c:pt>
+                <c:pt idx="6">
+                  <c:v>0.31</c:v>
+                </c:pt>
+              </c:numCache>
+            </c:numRef>
+          </c:val>
+          <c:smooth val="0"/>
+          <c:extLst>
+            <c:ext xmlns:c16="http://schemas.microsoft.com/office/drawing/2014/chart" uri="{C3380CC4-5D6E-409C-BE32-E72D297353CC}">
+              <c16:uniqueId val="{00000000-47DC-4947-8727-E928BDEAC05D}"/>
+            </c:ext>
+          </c:extLst>
+        </c:ser>
+        <c:dLbls>
+          <c:showLegendKey val="0"/>
+          <c:showVal val="0"/>
+          <c:showCatName val="0"/>
+          <c:showSerName val="0"/>
+          <c:showPercent val="0"/>
+          <c:showBubbleSize val="0"/>
+        </c:dLbls>
+        <c:smooth val="0"/>
+        <c:axId val="460140904"/>
+        <c:axId val="460141232"/>
+      </c:lineChart>
+      <c:catAx>
+        <c:axId val="460140904"/>
+        <c:scaling>
+          <c:orientation val="minMax"/>
+        </c:scaling>
+        <c:delete val="0"/>
+        <c:axPos val="b"/>
+        <c:numFmt formatCode="0" sourceLinked="1"/>
+        <c:majorTickMark val="none"/>
+        <c:minorTickMark val="none"/>
+        <c:tickLblPos val="nextTo"/>
+        <c:spPr>
+          <a:noFill/>
+          <a:ln w="9525" cap="flat" cmpd="sng" algn="ctr">
+            <a:solidFill>
+              <a:schemeClr val="tx1">
+                <a:lumMod val="15000"/>
+                <a:lumOff val="85000"/>
+              </a:schemeClr>
+            </a:solidFill>
+            <a:round/>
+          </a:ln>
+          <a:effectLst/>
+        </c:spPr>
+        <c:txPr>
+          <a:bodyPr rot="-60000000" spcFirstLastPara="1" vertOverflow="ellipsis" vert="horz" wrap="square" anchor="ctr" anchorCtr="1"/>
+          <a:lstStyle/>
+          <a:p>
+            <a:pPr>
+              <a:defRPr sz="900" b="0" i="0" u="none" strike="noStrike" kern="1200" baseline="0">
+                <a:solidFill>
+                  <a:schemeClr val="tx1">
+                    <a:lumMod val="65000"/>
+                    <a:lumOff val="35000"/>
+                  </a:schemeClr>
+                </a:solidFill>
+                <a:latin typeface="+mn-lt"/>
+                <a:ea typeface="+mn-ea"/>
+                <a:cs typeface="+mn-cs"/>
+              </a:defRPr>
+            </a:pPr>
+            <a:endParaRPr lang="de-DE"/>
+          </a:p>
+        </c:txPr>
+        <c:crossAx val="460141232"/>
+        <c:crosses val="autoZero"/>
+        <c:auto val="1"/>
+        <c:lblAlgn val="ctr"/>
+        <c:lblOffset val="100"/>
+        <c:noMultiLvlLbl val="0"/>
+      </c:catAx>
+      <c:valAx>
+        <c:axId val="460141232"/>
+        <c:scaling>
+          <c:orientation val="minMax"/>
+        </c:scaling>
+        <c:delete val="0"/>
+        <c:axPos val="l"/>
+        <c:majorGridlines>
+          <c:spPr>
+            <a:ln w="9525" cap="flat" cmpd="sng" algn="ctr">
+              <a:solidFill>
+                <a:schemeClr val="tx1">
+                  <a:lumMod val="15000"/>
+                  <a:lumOff val="85000"/>
+                </a:schemeClr>
+              </a:solidFill>
+              <a:round/>
+            </a:ln>
+            <a:effectLst/>
+          </c:spPr>
+        </c:majorGridlines>
+        <c:numFmt formatCode="0.000" sourceLinked="1"/>
+        <c:majorTickMark val="none"/>
+        <c:minorTickMark val="none"/>
+        <c:tickLblPos val="nextTo"/>
+        <c:spPr>
+          <a:noFill/>
+          <a:ln>
+            <a:noFill/>
+          </a:ln>
+          <a:effectLst/>
+        </c:spPr>
+        <c:txPr>
+          <a:bodyPr rot="-60000000" spcFirstLastPara="1" vertOverflow="ellipsis" vert="horz" wrap="square" anchor="ctr" anchorCtr="1"/>
+          <a:lstStyle/>
+          <a:p>
+            <a:pPr>
+              <a:defRPr sz="900" b="0" i="0" u="none" strike="noStrike" kern="1200" baseline="0">
+                <a:solidFill>
+                  <a:schemeClr val="tx1">
+                    <a:lumMod val="65000"/>
+                    <a:lumOff val="35000"/>
+                  </a:schemeClr>
+                </a:solidFill>
+                <a:latin typeface="+mn-lt"/>
+                <a:ea typeface="+mn-ea"/>
+                <a:cs typeface="+mn-cs"/>
+              </a:defRPr>
+            </a:pPr>
+            <a:endParaRPr lang="de-DE"/>
+          </a:p>
+        </c:txPr>
+        <c:crossAx val="460140904"/>
+        <c:crosses val="autoZero"/>
+        <c:crossBetween val="between"/>
+      </c:valAx>
+      <c:spPr>
+        <a:noFill/>
+        <a:ln>
+          <a:noFill/>
+        </a:ln>
+        <a:effectLst/>
+      </c:spPr>
+    </c:plotArea>
+    <c:plotVisOnly val="1"/>
+    <c:dispBlanksAs val="gap"/>
+    <c:showDLblsOverMax val="0"/>
+  </c:chart>
+  <c:spPr>
+    <a:noFill/>
+    <a:ln>
+      <a:noFill/>
+    </a:ln>
+    <a:effectLst/>
+  </c:spPr>
+  <c:txPr>
+    <a:bodyPr/>
+    <a:lstStyle/>
+    <a:p>
+      <a:pPr>
+        <a:defRPr/>
+      </a:pPr>
+      <a:endParaRPr lang="de-DE"/>
+    </a:p>
+  </c:txPr>
+  <c:externalData r:id="rId3">
+    <c:autoUpdate val="0"/>
+  </c:externalData>
+</c:chartSpace>
+</file>
+
+<file path=ppt/charts/chart4.xml><?xml version="1.0" encoding="utf-8"?>
+<c:chartSpace xmlns:c="http://schemas.openxmlformats.org/drawingml/2006/chart" xmlns:a="http://schemas.openxmlformats.org/drawingml/2006/main" xmlns:r="http://schemas.openxmlformats.org/officeDocument/2006/relationships" xmlns:c16r2="http://schemas.microsoft.com/office/drawing/2015/06/chart">
+  <c:date1904 val="0"/>
+  <c:lang val="de-DE"/>
+  <c:roundedCorners val="0"/>
+  <mc:AlternateContent xmlns:mc="http://schemas.openxmlformats.org/markup-compatibility/2006">
+    <mc:Choice xmlns:c14="http://schemas.microsoft.com/office/drawing/2007/8/2/chart" Requires="c14">
+      <c14:style val="102"/>
+    </mc:Choice>
+    <mc:Fallback>
+      <c:style val="2"/>
+    </mc:Fallback>
+  </mc:AlternateContent>
+  <c:chart>
+    <c:title>
+      <c:overlay val="0"/>
+      <c:spPr>
+        <a:noFill/>
+        <a:ln>
+          <a:noFill/>
+        </a:ln>
+        <a:effectLst/>
+      </c:spPr>
+      <c:txPr>
+        <a:bodyPr rot="0" spcFirstLastPara="1" vertOverflow="ellipsis" vert="horz" wrap="square" anchor="ctr" anchorCtr="1"/>
+        <a:lstStyle/>
+        <a:p>
+          <a:pPr>
+            <a:defRPr sz="1400" b="0" i="0" u="none" strike="noStrike" kern="1200" spc="0" baseline="0">
+              <a:solidFill>
+                <a:schemeClr val="tx1">
+                  <a:lumMod val="65000"/>
+                  <a:lumOff val="35000"/>
+                </a:schemeClr>
+              </a:solidFill>
+              <a:latin typeface="+mn-lt"/>
+              <a:ea typeface="+mn-ea"/>
+              <a:cs typeface="+mn-cs"/>
+            </a:defRPr>
+          </a:pPr>
+          <a:endParaRPr lang="de-DE"/>
+        </a:p>
+      </c:txPr>
+    </c:title>
+    <c:autoTitleDeleted val="0"/>
+    <c:plotArea>
+      <c:layout/>
+      <c:lineChart>
+        <c:grouping val="standard"/>
+        <c:varyColors val="0"/>
+        <c:ser>
+          <c:idx val="0"/>
+          <c:order val="0"/>
+          <c:tx>
+            <c:v>Accuracy</c:v>
+          </c:tx>
+          <c:spPr>
+            <a:ln w="28575" cap="rnd">
+              <a:solidFill>
+                <a:schemeClr val="tx2"/>
+              </a:solidFill>
+              <a:round/>
+            </a:ln>
+            <a:effectLst/>
+          </c:spPr>
+          <c:marker>
+            <c:symbol val="none"/>
+          </c:marker>
+          <c:cat>
+            <c:numRef>
+              <c:f>Rates!$A$3:$A$10</c:f>
+              <c:numCache>
+                <c:formatCode>0</c:formatCode>
+                <c:ptCount val="8"/>
+                <c:pt idx="0">
+                  <c:v>1</c:v>
+                </c:pt>
+                <c:pt idx="1">
+                  <c:v>5</c:v>
+                </c:pt>
+                <c:pt idx="2">
+                  <c:v>10</c:v>
+                </c:pt>
+                <c:pt idx="3">
+                  <c:v>50</c:v>
+                </c:pt>
+                <c:pt idx="4">
+                  <c:v>100</c:v>
+                </c:pt>
+                <c:pt idx="5">
+                  <c:v>500</c:v>
+                </c:pt>
+                <c:pt idx="6">
+                  <c:v>1000</c:v>
+                </c:pt>
+              </c:numCache>
+            </c:numRef>
+          </c:cat>
+          <c:val>
+            <c:numRef>
+              <c:f>Rates!$B$3:$B$8</c:f>
+              <c:numCache>
+                <c:formatCode>0.000</c:formatCode>
+                <c:ptCount val="6"/>
+                <c:pt idx="0">
+                  <c:v>0.97499999999999998</c:v>
+                </c:pt>
+                <c:pt idx="1">
+                  <c:v>0.99299999999999999</c:v>
+                </c:pt>
+                <c:pt idx="2">
+                  <c:v>0.99370000000000003</c:v>
+                </c:pt>
+                <c:pt idx="3">
+                  <c:v>0.995</c:v>
+                </c:pt>
+                <c:pt idx="4">
+                  <c:v>0.997</c:v>
+                </c:pt>
+                <c:pt idx="5">
+                  <c:v>0.997</c:v>
+                </c:pt>
+              </c:numCache>
+            </c:numRef>
+          </c:val>
+          <c:smooth val="0"/>
+          <c:extLst>
+            <c:ext xmlns:c16="http://schemas.microsoft.com/office/drawing/2014/chart" uri="{C3380CC4-5D6E-409C-BE32-E72D297353CC}">
+              <c16:uniqueId val="{00000000-F064-4673-8C2C-EC0087F3ED4B}"/>
+            </c:ext>
+          </c:extLst>
+        </c:ser>
+        <c:dLbls>
+          <c:showLegendKey val="0"/>
+          <c:showVal val="0"/>
+          <c:showCatName val="0"/>
+          <c:showSerName val="0"/>
+          <c:showPercent val="0"/>
+          <c:showBubbleSize val="0"/>
+        </c:dLbls>
+        <c:smooth val="0"/>
+        <c:axId val="461312648"/>
+        <c:axId val="461309696"/>
+      </c:lineChart>
+      <c:catAx>
+        <c:axId val="461312648"/>
+        <c:scaling>
+          <c:orientation val="minMax"/>
+        </c:scaling>
+        <c:delete val="0"/>
+        <c:axPos val="b"/>
+        <c:numFmt formatCode="0" sourceLinked="1"/>
+        <c:majorTickMark val="none"/>
+        <c:minorTickMark val="none"/>
+        <c:tickLblPos val="nextTo"/>
+        <c:spPr>
+          <a:noFill/>
+          <a:ln w="9525" cap="flat" cmpd="sng" algn="ctr">
+            <a:solidFill>
+              <a:schemeClr val="tx1">
+                <a:lumMod val="15000"/>
+                <a:lumOff val="85000"/>
+              </a:schemeClr>
+            </a:solidFill>
+            <a:round/>
+          </a:ln>
+          <a:effectLst/>
+        </c:spPr>
+        <c:txPr>
+          <a:bodyPr rot="-60000000" spcFirstLastPara="1" vertOverflow="ellipsis" vert="horz" wrap="square" anchor="ctr" anchorCtr="1"/>
+          <a:lstStyle/>
+          <a:p>
+            <a:pPr>
+              <a:defRPr sz="900" b="0" i="0" u="none" strike="noStrike" kern="1200" baseline="0">
+                <a:solidFill>
+                  <a:schemeClr val="tx1">
+                    <a:lumMod val="65000"/>
+                    <a:lumOff val="35000"/>
+                  </a:schemeClr>
+                </a:solidFill>
+                <a:latin typeface="+mn-lt"/>
+                <a:ea typeface="+mn-ea"/>
+                <a:cs typeface="+mn-cs"/>
+              </a:defRPr>
+            </a:pPr>
+            <a:endParaRPr lang="de-DE"/>
+          </a:p>
+        </c:txPr>
+        <c:crossAx val="461309696"/>
+        <c:crosses val="autoZero"/>
+        <c:auto val="1"/>
+        <c:lblAlgn val="ctr"/>
+        <c:lblOffset val="100"/>
+        <c:noMultiLvlLbl val="0"/>
+      </c:catAx>
+      <c:valAx>
+        <c:axId val="461309696"/>
+        <c:scaling>
+          <c:orientation val="minMax"/>
+        </c:scaling>
+        <c:delete val="0"/>
+        <c:axPos val="l"/>
+        <c:majorGridlines>
+          <c:spPr>
+            <a:ln w="9525" cap="flat" cmpd="sng" algn="ctr">
+              <a:solidFill>
+                <a:schemeClr val="tx1">
+                  <a:lumMod val="15000"/>
+                  <a:lumOff val="85000"/>
+                </a:schemeClr>
+              </a:solidFill>
+              <a:round/>
+            </a:ln>
+            <a:effectLst/>
+          </c:spPr>
+        </c:majorGridlines>
+        <c:numFmt formatCode="0.000" sourceLinked="1"/>
+        <c:majorTickMark val="none"/>
+        <c:minorTickMark val="none"/>
+        <c:tickLblPos val="nextTo"/>
+        <c:spPr>
+          <a:noFill/>
+          <a:ln>
+            <a:noFill/>
+          </a:ln>
+          <a:effectLst/>
+        </c:spPr>
+        <c:txPr>
+          <a:bodyPr rot="-60000000" spcFirstLastPara="1" vertOverflow="ellipsis" vert="horz" wrap="square" anchor="ctr" anchorCtr="1"/>
+          <a:lstStyle/>
+          <a:p>
+            <a:pPr>
+              <a:defRPr sz="900" b="0" i="0" u="none" strike="noStrike" kern="1200" baseline="0">
+                <a:solidFill>
+                  <a:schemeClr val="tx1">
+                    <a:lumMod val="65000"/>
+                    <a:lumOff val="35000"/>
+                  </a:schemeClr>
+                </a:solidFill>
+                <a:latin typeface="+mn-lt"/>
+                <a:ea typeface="+mn-ea"/>
+                <a:cs typeface="+mn-cs"/>
+              </a:defRPr>
+            </a:pPr>
+            <a:endParaRPr lang="de-DE"/>
+          </a:p>
+        </c:txPr>
+        <c:crossAx val="461312648"/>
+        <c:crosses val="autoZero"/>
+        <c:crossBetween val="between"/>
+      </c:valAx>
+      <c:spPr>
+        <a:noFill/>
+        <a:ln>
+          <a:noFill/>
+        </a:ln>
+        <a:effectLst/>
+      </c:spPr>
+    </c:plotArea>
+    <c:plotVisOnly val="1"/>
+    <c:dispBlanksAs val="gap"/>
+    <c:showDLblsOverMax val="0"/>
+  </c:chart>
+  <c:spPr>
+    <a:noFill/>
+    <a:ln>
+      <a:noFill/>
+    </a:ln>
+    <a:effectLst/>
+  </c:spPr>
+  <c:txPr>
+    <a:bodyPr/>
+    <a:lstStyle/>
+    <a:p>
+      <a:pPr>
+        <a:defRPr/>
+      </a:pPr>
+      <a:endParaRPr lang="de-DE"/>
+    </a:p>
+  </c:txPr>
+  <c:externalData r:id="rId3">
+    <c:autoUpdate val="0"/>
+  </c:externalData>
+</c:chartSpace>
+</file>
+
+<file path=ppt/charts/colors1.xml><?xml version="1.0" encoding="utf-8"?>
+<cs:colorStyle xmlns:cs="http://schemas.microsoft.com/office/drawing/2012/chartStyle" xmlns:a="http://schemas.openxmlformats.org/drawingml/2006/main" meth="cycle" id="10">
+  <a:schemeClr val="accent1"/>
+  <a:schemeClr val="accent2"/>
+  <a:schemeClr val="accent3"/>
+  <a:schemeClr val="accent4"/>
+  <a:schemeClr val="accent5"/>
+  <a:schemeClr val="accent6"/>
+  <cs:variation/>
+  <cs:variation>
+    <a:lumMod val="60000"/>
+  </cs:variation>
+  <cs:variation>
+    <a:lumMod val="80000"/>
+    <a:lumOff val="20000"/>
+  </cs:variation>
+  <cs:variation>
+    <a:lumMod val="80000"/>
+  </cs:variation>
+  <cs:variation>
+    <a:lumMod val="60000"/>
+    <a:lumOff val="40000"/>
+  </cs:variation>
+  <cs:variation>
+    <a:lumMod val="50000"/>
+  </cs:variation>
+  <cs:variation>
+    <a:lumMod val="70000"/>
+    <a:lumOff val="30000"/>
+  </cs:variation>
+  <cs:variation>
+    <a:lumMod val="70000"/>
+  </cs:variation>
+  <cs:variation>
+    <a:lumMod val="50000"/>
+    <a:lumOff val="50000"/>
+  </cs:variation>
+</cs:colorStyle>
+</file>
+
+<file path=ppt/charts/colors2.xml><?xml version="1.0" encoding="utf-8"?>
+<cs:colorStyle xmlns:cs="http://schemas.microsoft.com/office/drawing/2012/chartStyle" xmlns:a="http://schemas.openxmlformats.org/drawingml/2006/main" meth="cycle" id="10">
+  <a:schemeClr val="accent1"/>
+  <a:schemeClr val="accent2"/>
+  <a:schemeClr val="accent3"/>
+  <a:schemeClr val="accent4"/>
+  <a:schemeClr val="accent5"/>
+  <a:schemeClr val="accent6"/>
+  <cs:variation/>
+  <cs:variation>
+    <a:lumMod val="60000"/>
+  </cs:variation>
+  <cs:variation>
+    <a:lumMod val="80000"/>
+    <a:lumOff val="20000"/>
+  </cs:variation>
+  <cs:variation>
+    <a:lumMod val="80000"/>
+  </cs:variation>
+  <cs:variation>
+    <a:lumMod val="60000"/>
+    <a:lumOff val="40000"/>
+  </cs:variation>
+  <cs:variation>
+    <a:lumMod val="50000"/>
+  </cs:variation>
+  <cs:variation>
+    <a:lumMod val="70000"/>
+    <a:lumOff val="30000"/>
+  </cs:variation>
+  <cs:variation>
+    <a:lumMod val="70000"/>
+  </cs:variation>
+  <cs:variation>
+    <a:lumMod val="50000"/>
+    <a:lumOff val="50000"/>
+  </cs:variation>
+</cs:colorStyle>
+</file>
+
+<file path=ppt/charts/colors3.xml><?xml version="1.0" encoding="utf-8"?>
+<cs:colorStyle xmlns:cs="http://schemas.microsoft.com/office/drawing/2012/chartStyle" xmlns:a="http://schemas.openxmlformats.org/drawingml/2006/main" meth="cycle" id="10">
+  <a:schemeClr val="accent1"/>
+  <a:schemeClr val="accent2"/>
+  <a:schemeClr val="accent3"/>
+  <a:schemeClr val="accent4"/>
+  <a:schemeClr val="accent5"/>
+  <a:schemeClr val="accent6"/>
+  <cs:variation/>
+  <cs:variation>
+    <a:lumMod val="60000"/>
+  </cs:variation>
+  <cs:variation>
+    <a:lumMod val="80000"/>
+    <a:lumOff val="20000"/>
+  </cs:variation>
+  <cs:variation>
+    <a:lumMod val="80000"/>
+  </cs:variation>
+  <cs:variation>
+    <a:lumMod val="60000"/>
+    <a:lumOff val="40000"/>
+  </cs:variation>
+  <cs:variation>
+    <a:lumMod val="50000"/>
+  </cs:variation>
+  <cs:variation>
+    <a:lumMod val="70000"/>
+    <a:lumOff val="30000"/>
+  </cs:variation>
+  <cs:variation>
+    <a:lumMod val="70000"/>
+  </cs:variation>
+  <cs:variation>
+    <a:lumMod val="50000"/>
+    <a:lumOff val="50000"/>
+  </cs:variation>
+</cs:colorStyle>
+</file>
+
+<file path=ppt/charts/colors4.xml><?xml version="1.0" encoding="utf-8"?>
+<cs:colorStyle xmlns:cs="http://schemas.microsoft.com/office/drawing/2012/chartStyle" xmlns:a="http://schemas.openxmlformats.org/drawingml/2006/main" meth="cycle" id="10">
+  <a:schemeClr val="accent1"/>
+  <a:schemeClr val="accent2"/>
+  <a:schemeClr val="accent3"/>
+  <a:schemeClr val="accent4"/>
+  <a:schemeClr val="accent5"/>
+  <a:schemeClr val="accent6"/>
+  <cs:variation/>
+  <cs:variation>
+    <a:lumMod val="60000"/>
+  </cs:variation>
+  <cs:variation>
+    <a:lumMod val="80000"/>
+    <a:lumOff val="20000"/>
+  </cs:variation>
+  <cs:variation>
+    <a:lumMod val="80000"/>
+  </cs:variation>
+  <cs:variation>
+    <a:lumMod val="60000"/>
+    <a:lumOff val="40000"/>
+  </cs:variation>
+  <cs:variation>
+    <a:lumMod val="50000"/>
+  </cs:variation>
+  <cs:variation>
+    <a:lumMod val="70000"/>
+    <a:lumOff val="30000"/>
+  </cs:variation>
+  <cs:variation>
+    <a:lumMod val="70000"/>
+  </cs:variation>
+  <cs:variation>
+    <a:lumMod val="50000"/>
+    <a:lumOff val="50000"/>
+  </cs:variation>
+</cs:colorStyle>
+</file>
+
+<file path=ppt/charts/style1.xml><?xml version="1.0" encoding="utf-8"?>
+<cs:chartStyle xmlns:cs="http://schemas.microsoft.com/office/drawing/2012/chartStyle" xmlns:a="http://schemas.openxmlformats.org/drawingml/2006/main" id="227">
+  <cs:axisTitle>
+    <cs:lnRef idx="0"/>
+    <cs:fillRef idx="0"/>
+    <cs:effectRef idx="0"/>
+    <cs:fontRef idx="minor">
+      <a:schemeClr val="tx1">
+        <a:lumMod val="65000"/>
+        <a:lumOff val="35000"/>
+      </a:schemeClr>
+    </cs:fontRef>
+    <cs:defRPr sz="1000" kern="1200"/>
+  </cs:axisTitle>
+  <cs:categoryAxis>
+    <cs:lnRef idx="0"/>
+    <cs:fillRef idx="0"/>
+    <cs:effectRef idx="0"/>
+    <cs:fontRef idx="minor">
+      <a:schemeClr val="tx1">
+        <a:lumMod val="65000"/>
+        <a:lumOff val="35000"/>
+      </a:schemeClr>
+    </cs:fontRef>
+    <cs:spPr>
+      <a:ln w="9525" cap="flat" cmpd="sng" algn="ctr">
+        <a:solidFill>
+          <a:schemeClr val="tx1">
+            <a:lumMod val="15000"/>
+            <a:lumOff val="85000"/>
+          </a:schemeClr>
+        </a:solidFill>
+        <a:round/>
+      </a:ln>
+    </cs:spPr>
+    <cs:defRPr sz="900" kern="1200"/>
+  </cs:categoryAxis>
+  <cs:chartArea mods="allowNoFillOverride allowNoLineOverride">
+    <cs:lnRef idx="0"/>
+    <cs:fillRef idx="0"/>
+    <cs:effectRef idx="0"/>
+    <cs:fontRef idx="minor">
+      <a:schemeClr val="tx1"/>
+    </cs:fontRef>
+    <cs:spPr>
+      <a:solidFill>
+        <a:schemeClr val="bg1"/>
+      </a:solidFill>
+      <a:ln w="9525" cap="flat" cmpd="sng" algn="ctr">
+        <a:solidFill>
+          <a:schemeClr val="tx1">
+            <a:lumMod val="15000"/>
+            <a:lumOff val="85000"/>
+          </a:schemeClr>
+        </a:solidFill>
+        <a:round/>
+      </a:ln>
+    </cs:spPr>
+    <cs:defRPr sz="1000" kern="1200"/>
+  </cs:chartArea>
+  <cs:dataLabel>
+    <cs:lnRef idx="0"/>
+    <cs:fillRef idx="0"/>
+    <cs:effectRef idx="0"/>
+    <cs:fontRef idx="minor">
+      <a:schemeClr val="tx1">
+        <a:lumMod val="75000"/>
+        <a:lumOff val="25000"/>
+      </a:schemeClr>
+    </cs:fontRef>
+    <cs:defRPr sz="900" kern="1200"/>
+  </cs:dataLabel>
+  <cs:dataLabelCallout>
+    <cs:lnRef idx="0"/>
+    <cs:fillRef idx="0"/>
+    <cs:effectRef idx="0"/>
+    <cs:fontRef idx="minor">
+      <a:schemeClr val="dk1">
+        <a:lumMod val="65000"/>
+        <a:lumOff val="35000"/>
+      </a:schemeClr>
+    </cs:fontRef>
+    <cs:spPr>
+      <a:solidFill>
+        <a:schemeClr val="lt1"/>
+      </a:solidFill>
+      <a:ln>
+        <a:solidFill>
+          <a:schemeClr val="dk1">
+            <a:lumMod val="25000"/>
+            <a:lumOff val="75000"/>
+          </a:schemeClr>
+        </a:solidFill>
+      </a:ln>
+    </cs:spPr>
+    <cs:defRPr sz="900" kern="1200"/>
+    <cs:bodyPr rot="0" spcFirstLastPara="1" vertOverflow="clip" horzOverflow="clip" vert="horz" wrap="square" lIns="36576" tIns="18288" rIns="36576" bIns="18288" anchor="ctr" anchorCtr="1">
+      <a:spAutoFit/>
+    </cs:bodyPr>
+  </cs:dataLabelCallout>
+  <cs:dataPoint>
+    <cs:lnRef idx="0"/>
+    <cs:fillRef idx="1">
+      <cs:styleClr val="auto"/>
+    </cs:fillRef>
+    <cs:effectRef idx="0"/>
+    <cs:fontRef idx="minor">
+      <a:schemeClr val="tx1"/>
+    </cs:fontRef>
+    <cs:spPr>
+      <a:solidFill>
+        <a:schemeClr val="phClr"/>
+      </a:solidFill>
+    </cs:spPr>
+  </cs:dataPoint>
+  <cs:dataPoint3D>
+    <cs:lnRef idx="0"/>
+    <cs:fillRef idx="1">
+      <cs:styleClr val="auto"/>
+    </cs:fillRef>
+    <cs:effectRef idx="0"/>
+    <cs:fontRef idx="minor">
+      <a:schemeClr val="tx1"/>
+    </cs:fontRef>
+    <cs:spPr>
+      <a:solidFill>
+        <a:schemeClr val="phClr"/>
+      </a:solidFill>
+    </cs:spPr>
+  </cs:dataPoint3D>
+  <cs:dataPointLine>
+    <cs:lnRef idx="0">
+      <cs:styleClr val="auto"/>
+    </cs:lnRef>
+    <cs:fillRef idx="1"/>
+    <cs:effectRef idx="0"/>
+    <cs:fontRef idx="minor">
+      <a:schemeClr val="tx1"/>
+    </cs:fontRef>
+    <cs:spPr>
+      <a:ln w="28575" cap="rnd">
+        <a:solidFill>
+          <a:schemeClr val="phClr"/>
+        </a:solidFill>
+        <a:round/>
+      </a:ln>
+    </cs:spPr>
+  </cs:dataPointLine>
+  <cs:dataPointMarker>
+    <cs:lnRef idx="0">
+      <cs:styleClr val="auto"/>
+    </cs:lnRef>
+    <cs:fillRef idx="1">
+      <cs:styleClr val="auto"/>
+    </cs:fillRef>
+    <cs:effectRef idx="0"/>
+    <cs:fontRef idx="minor">
+      <a:schemeClr val="tx1"/>
+    </cs:fontRef>
+    <cs:spPr>
+      <a:solidFill>
+        <a:schemeClr val="phClr"/>
+      </a:solidFill>
+      <a:ln w="9525">
+        <a:solidFill>
+          <a:schemeClr val="phClr"/>
+        </a:solidFill>
+      </a:ln>
+    </cs:spPr>
+  </cs:dataPointMarker>
+  <cs:dataPointMarkerLayout symbol="circle" size="5"/>
+  <cs:dataPointWireframe>
+    <cs:lnRef idx="0">
+      <cs:styleClr val="auto"/>
+    </cs:lnRef>
+    <cs:fillRef idx="1"/>
+    <cs:effectRef idx="0"/>
+    <cs:fontRef idx="minor">
+      <a:schemeClr val="tx1"/>
+    </cs:fontRef>
+    <cs:spPr>
+      <a:ln w="9525" cap="rnd">
+        <a:solidFill>
+          <a:schemeClr val="phClr"/>
+        </a:solidFill>
+        <a:round/>
+      </a:ln>
+    </cs:spPr>
+  </cs:dataPointWireframe>
+  <cs:dataTable>
+    <cs:lnRef idx="0"/>
+    <cs:fillRef idx="0"/>
+    <cs:effectRef idx="0"/>
+    <cs:fontRef idx="minor">
+      <a:schemeClr val="tx1">
+        <a:lumMod val="65000"/>
+        <a:lumOff val="35000"/>
+      </a:schemeClr>
+    </cs:fontRef>
+    <cs:spPr>
+      <a:noFill/>
+      <a:ln w="9525" cap="flat" cmpd="sng" algn="ctr">
+        <a:solidFill>
+          <a:schemeClr val="tx1">
+            <a:lumMod val="15000"/>
+            <a:lumOff val="85000"/>
+          </a:schemeClr>
+        </a:solidFill>
+        <a:round/>
+      </a:ln>
+    </cs:spPr>
+    <cs:defRPr sz="900" kern="1200"/>
+  </cs:dataTable>
+  <cs:downBar>
+    <cs:lnRef idx="0"/>
+    <cs:fillRef idx="0"/>
+    <cs:effectRef idx="0"/>
+    <cs:fontRef idx="minor">
+      <a:schemeClr val="dk1"/>
+    </cs:fontRef>
+    <cs:spPr>
+      <a:solidFill>
+        <a:schemeClr val="dk1">
+          <a:lumMod val="65000"/>
+          <a:lumOff val="35000"/>
+        </a:schemeClr>
+      </a:solidFill>
+      <a:ln w="9525">
+        <a:solidFill>
+          <a:schemeClr val="tx1">
+            <a:lumMod val="65000"/>
+            <a:lumOff val="35000"/>
+          </a:schemeClr>
+        </a:solidFill>
+      </a:ln>
+    </cs:spPr>
+  </cs:downBar>
+  <cs:dropLine>
+    <cs:lnRef idx="0"/>
+    <cs:fillRef idx="0"/>
+    <cs:effectRef idx="0"/>
+    <cs:fontRef idx="minor">
+      <a:schemeClr val="tx1"/>
+    </cs:fontRef>
+    <cs:spPr>
+      <a:ln w="9525" cap="flat" cmpd="sng" algn="ctr">
+        <a:solidFill>
+          <a:schemeClr val="tx1">
+            <a:lumMod val="35000"/>
+            <a:lumOff val="65000"/>
+          </a:schemeClr>
+        </a:solidFill>
+        <a:round/>
+      </a:ln>
+    </cs:spPr>
+  </cs:dropLine>
+  <cs:errorBar>
+    <cs:lnRef idx="0"/>
+    <cs:fillRef idx="0"/>
+    <cs:effectRef idx="0"/>
+    <cs:fontRef idx="minor">
+      <a:schemeClr val="tx1"/>
+    </cs:fontRef>
+    <cs:spPr>
+      <a:ln w="9525" cap="flat" cmpd="sng" algn="ctr">
+        <a:solidFill>
+          <a:schemeClr val="tx1">
+            <a:lumMod val="65000"/>
+            <a:lumOff val="35000"/>
+          </a:schemeClr>
+        </a:solidFill>
+        <a:round/>
+      </a:ln>
+    </cs:spPr>
+  </cs:errorBar>
+  <cs:floor>
+    <cs:lnRef idx="0"/>
+    <cs:fillRef idx="0"/>
+    <cs:effectRef idx="0"/>
+    <cs:fontRef idx="minor">
+      <a:schemeClr val="tx1"/>
+    </cs:fontRef>
+    <cs:spPr>
+      <a:noFill/>
+      <a:ln>
+        <a:noFill/>
+      </a:ln>
+    </cs:spPr>
+  </cs:floor>
+  <cs:gridlineMajor>
+    <cs:lnRef idx="0"/>
+    <cs:fillRef idx="0"/>
+    <cs:effectRef idx="0"/>
+    <cs:fontRef idx="minor">
+      <a:schemeClr val="tx1"/>
+    </cs:fontRef>
+    <cs:spPr>
+      <a:ln w="9525" cap="flat" cmpd="sng" algn="ctr">
+        <a:solidFill>
+          <a:schemeClr val="tx1">
+            <a:lumMod val="15000"/>
+            <a:lumOff val="85000"/>
+          </a:schemeClr>
+        </a:solidFill>
+        <a:round/>
+      </a:ln>
+    </cs:spPr>
+  </cs:gridlineMajor>
+  <cs:gridlineMinor>
+    <cs:lnRef idx="0"/>
+    <cs:fillRef idx="0"/>
+    <cs:effectRef idx="0"/>
+    <cs:fontRef idx="minor">
+      <a:schemeClr val="tx1"/>
+    </cs:fontRef>
+    <cs:spPr>
+      <a:ln w="9525" cap="flat" cmpd="sng" algn="ctr">
+        <a:solidFill>
+          <a:schemeClr val="tx1">
+            <a:lumMod val="5000"/>
+            <a:lumOff val="95000"/>
+          </a:schemeClr>
+        </a:solidFill>
+        <a:round/>
+      </a:ln>
+    </cs:spPr>
+  </cs:gridlineMinor>
+  <cs:hiLoLine>
+    <cs:lnRef idx="0"/>
+    <cs:fillRef idx="0"/>
+    <cs:effectRef idx="0"/>
+    <cs:fontRef idx="minor">
+      <a:schemeClr val="tx1"/>
+    </cs:fontRef>
+    <cs:spPr>
+      <a:ln w="9525" cap="flat" cmpd="sng" algn="ctr">
+        <a:solidFill>
+          <a:schemeClr val="tx1">
+            <a:lumMod val="75000"/>
+            <a:lumOff val="25000"/>
+          </a:schemeClr>
+        </a:solidFill>
+        <a:round/>
+      </a:ln>
+    </cs:spPr>
+  </cs:hiLoLine>
+  <cs:leaderLine>
+    <cs:lnRef idx="0"/>
+    <cs:fillRef idx="0"/>
+    <cs:effectRef idx="0"/>
+    <cs:fontRef idx="minor">
+      <a:schemeClr val="tx1"/>
+    </cs:fontRef>
+    <cs:spPr>
+      <a:ln w="9525" cap="flat" cmpd="sng" algn="ctr">
+        <a:solidFill>
+          <a:schemeClr val="tx1">
+            <a:lumMod val="35000"/>
+            <a:lumOff val="65000"/>
+          </a:schemeClr>
+        </a:solidFill>
+        <a:round/>
+      </a:ln>
+    </cs:spPr>
+  </cs:leaderLine>
+  <cs:legend>
+    <cs:lnRef idx="0"/>
+    <cs:fillRef idx="0"/>
+    <cs:effectRef idx="0"/>
+    <cs:fontRef idx="minor">
+      <a:schemeClr val="tx1">
+        <a:lumMod val="65000"/>
+        <a:lumOff val="35000"/>
+      </a:schemeClr>
+    </cs:fontRef>
+    <cs:defRPr sz="900" kern="1200"/>
+  </cs:legend>
+  <cs:plotArea mods="allowNoFillOverride allowNoLineOverride">
+    <cs:lnRef idx="0"/>
+    <cs:fillRef idx="0"/>
+    <cs:effectRef idx="0"/>
+    <cs:fontRef idx="minor">
+      <a:schemeClr val="tx1"/>
+    </cs:fontRef>
+  </cs:plotArea>
+  <cs:plotArea3D mods="allowNoFillOverride allowNoLineOverride">
+    <cs:lnRef idx="0"/>
+    <cs:fillRef idx="0"/>
+    <cs:effectRef idx="0"/>
+    <cs:fontRef idx="minor">
+      <a:schemeClr val="tx1"/>
+    </cs:fontRef>
+  </cs:plotArea3D>
+  <cs:seriesAxis>
+    <cs:lnRef idx="0"/>
+    <cs:fillRef idx="0"/>
+    <cs:effectRef idx="0"/>
+    <cs:fontRef idx="minor">
+      <a:schemeClr val="tx1">
+        <a:lumMod val="65000"/>
+        <a:lumOff val="35000"/>
+      </a:schemeClr>
+    </cs:fontRef>
+    <cs:defRPr sz="900" kern="1200"/>
+  </cs:seriesAxis>
+  <cs:seriesLine>
+    <cs:lnRef idx="0"/>
+    <cs:fillRef idx="0"/>
+    <cs:effectRef idx="0"/>
+    <cs:fontRef idx="minor">
+      <a:schemeClr val="tx1"/>
+    </cs:fontRef>
+    <cs:spPr>
+      <a:ln w="9525" cap="flat" cmpd="sng" algn="ctr">
+        <a:solidFill>
+          <a:schemeClr val="tx1">
+            <a:lumMod val="35000"/>
+            <a:lumOff val="65000"/>
+          </a:schemeClr>
+        </a:solidFill>
+        <a:round/>
+      </a:ln>
+    </cs:spPr>
+  </cs:seriesLine>
+  <cs:title>
+    <cs:lnRef idx="0"/>
+    <cs:fillRef idx="0"/>
+    <cs:effectRef idx="0"/>
+    <cs:fontRef idx="minor">
+      <a:schemeClr val="tx1">
+        <a:lumMod val="65000"/>
+        <a:lumOff val="35000"/>
+      </a:schemeClr>
+    </cs:fontRef>
+    <cs:defRPr sz="1400" b="0" kern="1200" spc="0" baseline="0"/>
+  </cs:title>
+  <cs:trendline>
+    <cs:lnRef idx="0">
+      <cs:styleClr val="auto"/>
+    </cs:lnRef>
+    <cs:fillRef idx="0"/>
+    <cs:effectRef idx="0"/>
+    <cs:fontRef idx="minor">
+      <a:schemeClr val="tx1"/>
+    </cs:fontRef>
+    <cs:spPr>
+      <a:ln w="19050" cap="rnd">
+        <a:solidFill>
+          <a:schemeClr val="phClr"/>
+        </a:solidFill>
+        <a:prstDash val="sysDot"/>
+      </a:ln>
+    </cs:spPr>
+  </cs:trendline>
+  <cs:trendlineLabel>
+    <cs:lnRef idx="0"/>
+    <cs:fillRef idx="0"/>
+    <cs:effectRef idx="0"/>
+    <cs:fontRef idx="minor">
+      <a:schemeClr val="tx1">
+        <a:lumMod val="65000"/>
+        <a:lumOff val="35000"/>
+      </a:schemeClr>
+    </cs:fontRef>
+    <cs:defRPr sz="900" kern="1200"/>
+  </cs:trendlineLabel>
+  <cs:upBar>
+    <cs:lnRef idx="0"/>
+    <cs:fillRef idx="0"/>
+    <cs:effectRef idx="0"/>
+    <cs:fontRef idx="minor">
+      <a:schemeClr val="dk1"/>
+    </cs:fontRef>
+    <cs:spPr>
+      <a:solidFill>
+        <a:schemeClr val="lt1"/>
+      </a:solidFill>
+      <a:ln w="9525">
+        <a:solidFill>
+          <a:schemeClr val="tx1">
+            <a:lumMod val="15000"/>
+            <a:lumOff val="85000"/>
+          </a:schemeClr>
+        </a:solidFill>
+      </a:ln>
+    </cs:spPr>
+  </cs:upBar>
+  <cs:valueAxis>
+    <cs:lnRef idx="0"/>
+    <cs:fillRef idx="0"/>
+    <cs:effectRef idx="0"/>
+    <cs:fontRef idx="minor">
+      <a:schemeClr val="tx1">
+        <a:lumMod val="65000"/>
+        <a:lumOff val="35000"/>
+      </a:schemeClr>
+    </cs:fontRef>
+    <cs:defRPr sz="900" kern="1200"/>
+  </cs:valueAxis>
+  <cs:wall>
+    <cs:lnRef idx="0"/>
+    <cs:fillRef idx="0"/>
+    <cs:effectRef idx="0"/>
+    <cs:fontRef idx="minor">
+      <a:schemeClr val="tx1"/>
+    </cs:fontRef>
+    <cs:spPr>
+      <a:noFill/>
+      <a:ln>
+        <a:noFill/>
+      </a:ln>
+    </cs:spPr>
+  </cs:wall>
+</cs:chartStyle>
+</file>
+
+<file path=ppt/charts/style2.xml><?xml version="1.0" encoding="utf-8"?>
+<cs:chartStyle xmlns:cs="http://schemas.microsoft.com/office/drawing/2012/chartStyle" xmlns:a="http://schemas.openxmlformats.org/drawingml/2006/main" id="227">
+  <cs:axisTitle>
+    <cs:lnRef idx="0"/>
+    <cs:fillRef idx="0"/>
+    <cs:effectRef idx="0"/>
+    <cs:fontRef idx="minor">
+      <a:schemeClr val="tx1">
+        <a:lumMod val="65000"/>
+        <a:lumOff val="35000"/>
+      </a:schemeClr>
+    </cs:fontRef>
+    <cs:defRPr sz="1000" kern="1200"/>
+  </cs:axisTitle>
+  <cs:categoryAxis>
+    <cs:lnRef idx="0"/>
+    <cs:fillRef idx="0"/>
+    <cs:effectRef idx="0"/>
+    <cs:fontRef idx="minor">
+      <a:schemeClr val="tx1">
+        <a:lumMod val="65000"/>
+        <a:lumOff val="35000"/>
+      </a:schemeClr>
+    </cs:fontRef>
+    <cs:spPr>
+      <a:ln w="9525" cap="flat" cmpd="sng" algn="ctr">
+        <a:solidFill>
+          <a:schemeClr val="tx1">
+            <a:lumMod val="15000"/>
+            <a:lumOff val="85000"/>
+          </a:schemeClr>
+        </a:solidFill>
+        <a:round/>
+      </a:ln>
+    </cs:spPr>
+    <cs:defRPr sz="900" kern="1200"/>
+  </cs:categoryAxis>
+  <cs:chartArea mods="allowNoFillOverride allowNoLineOverride">
+    <cs:lnRef idx="0"/>
+    <cs:fillRef idx="0"/>
+    <cs:effectRef idx="0"/>
+    <cs:fontRef idx="minor">
+      <a:schemeClr val="tx1"/>
+    </cs:fontRef>
+    <cs:spPr>
+      <a:solidFill>
+        <a:schemeClr val="bg1"/>
+      </a:solidFill>
+      <a:ln w="9525" cap="flat" cmpd="sng" algn="ctr">
+        <a:solidFill>
+          <a:schemeClr val="tx1">
+            <a:lumMod val="15000"/>
+            <a:lumOff val="85000"/>
+          </a:schemeClr>
+        </a:solidFill>
+        <a:round/>
+      </a:ln>
+    </cs:spPr>
+    <cs:defRPr sz="1000" kern="1200"/>
+  </cs:chartArea>
+  <cs:dataLabel>
+    <cs:lnRef idx="0"/>
+    <cs:fillRef idx="0"/>
+    <cs:effectRef idx="0"/>
+    <cs:fontRef idx="minor">
+      <a:schemeClr val="tx1">
+        <a:lumMod val="75000"/>
+        <a:lumOff val="25000"/>
+      </a:schemeClr>
+    </cs:fontRef>
+    <cs:defRPr sz="900" kern="1200"/>
+  </cs:dataLabel>
+  <cs:dataLabelCallout>
+    <cs:lnRef idx="0"/>
+    <cs:fillRef idx="0"/>
+    <cs:effectRef idx="0"/>
+    <cs:fontRef idx="minor">
+      <a:schemeClr val="dk1">
+        <a:lumMod val="65000"/>
+        <a:lumOff val="35000"/>
+      </a:schemeClr>
+    </cs:fontRef>
+    <cs:spPr>
+      <a:solidFill>
+        <a:schemeClr val="lt1"/>
+      </a:solidFill>
+      <a:ln>
+        <a:solidFill>
+          <a:schemeClr val="dk1">
+            <a:lumMod val="25000"/>
+            <a:lumOff val="75000"/>
+          </a:schemeClr>
+        </a:solidFill>
+      </a:ln>
+    </cs:spPr>
+    <cs:defRPr sz="900" kern="1200"/>
+    <cs:bodyPr rot="0" spcFirstLastPara="1" vertOverflow="clip" horzOverflow="clip" vert="horz" wrap="square" lIns="36576" tIns="18288" rIns="36576" bIns="18288" anchor="ctr" anchorCtr="1">
+      <a:spAutoFit/>
+    </cs:bodyPr>
+  </cs:dataLabelCallout>
+  <cs:dataPoint>
+    <cs:lnRef idx="0"/>
+    <cs:fillRef idx="1">
+      <cs:styleClr val="auto"/>
+    </cs:fillRef>
+    <cs:effectRef idx="0"/>
+    <cs:fontRef idx="minor">
+      <a:schemeClr val="tx1"/>
+    </cs:fontRef>
+    <cs:spPr>
+      <a:solidFill>
+        <a:schemeClr val="phClr"/>
+      </a:solidFill>
+    </cs:spPr>
+  </cs:dataPoint>
+  <cs:dataPoint3D>
+    <cs:lnRef idx="0"/>
+    <cs:fillRef idx="1">
+      <cs:styleClr val="auto"/>
+    </cs:fillRef>
+    <cs:effectRef idx="0"/>
+    <cs:fontRef idx="minor">
+      <a:schemeClr val="tx1"/>
+    </cs:fontRef>
+    <cs:spPr>
+      <a:solidFill>
+        <a:schemeClr val="phClr"/>
+      </a:solidFill>
+    </cs:spPr>
+  </cs:dataPoint3D>
+  <cs:dataPointLine>
+    <cs:lnRef idx="0">
+      <cs:styleClr val="auto"/>
+    </cs:lnRef>
+    <cs:fillRef idx="1"/>
+    <cs:effectRef idx="0"/>
+    <cs:fontRef idx="minor">
+      <a:schemeClr val="tx1"/>
+    </cs:fontRef>
+    <cs:spPr>
+      <a:ln w="28575" cap="rnd">
+        <a:solidFill>
+          <a:schemeClr val="phClr"/>
+        </a:solidFill>
+        <a:round/>
+      </a:ln>
+    </cs:spPr>
+  </cs:dataPointLine>
+  <cs:dataPointMarker>
+    <cs:lnRef idx="0">
+      <cs:styleClr val="auto"/>
+    </cs:lnRef>
+    <cs:fillRef idx="1">
+      <cs:styleClr val="auto"/>
+    </cs:fillRef>
+    <cs:effectRef idx="0"/>
+    <cs:fontRef idx="minor">
+      <a:schemeClr val="tx1"/>
+    </cs:fontRef>
+    <cs:spPr>
+      <a:solidFill>
+        <a:schemeClr val="phClr"/>
+      </a:solidFill>
+      <a:ln w="9525">
+        <a:solidFill>
+          <a:schemeClr val="phClr"/>
+        </a:solidFill>
+      </a:ln>
+    </cs:spPr>
+  </cs:dataPointMarker>
+  <cs:dataPointMarkerLayout symbol="circle" size="5"/>
+  <cs:dataPointWireframe>
+    <cs:lnRef idx="0">
+      <cs:styleClr val="auto"/>
+    </cs:lnRef>
+    <cs:fillRef idx="1"/>
+    <cs:effectRef idx="0"/>
+    <cs:fontRef idx="minor">
+      <a:schemeClr val="tx1"/>
+    </cs:fontRef>
+    <cs:spPr>
+      <a:ln w="9525" cap="rnd">
+        <a:solidFill>
+          <a:schemeClr val="phClr"/>
+        </a:solidFill>
+        <a:round/>
+      </a:ln>
+    </cs:spPr>
+  </cs:dataPointWireframe>
+  <cs:dataTable>
+    <cs:lnRef idx="0"/>
+    <cs:fillRef idx="0"/>
+    <cs:effectRef idx="0"/>
+    <cs:fontRef idx="minor">
+      <a:schemeClr val="tx1">
+        <a:lumMod val="65000"/>
+        <a:lumOff val="35000"/>
+      </a:schemeClr>
+    </cs:fontRef>
+    <cs:spPr>
+      <a:noFill/>
+      <a:ln w="9525" cap="flat" cmpd="sng" algn="ctr">
+        <a:solidFill>
+          <a:schemeClr val="tx1">
+            <a:lumMod val="15000"/>
+            <a:lumOff val="85000"/>
+          </a:schemeClr>
+        </a:solidFill>
+        <a:round/>
+      </a:ln>
+    </cs:spPr>
+    <cs:defRPr sz="900" kern="1200"/>
+  </cs:dataTable>
+  <cs:downBar>
+    <cs:lnRef idx="0"/>
+    <cs:fillRef idx="0"/>
+    <cs:effectRef idx="0"/>
+    <cs:fontRef idx="minor">
+      <a:schemeClr val="dk1"/>
+    </cs:fontRef>
+    <cs:spPr>
+      <a:solidFill>
+        <a:schemeClr val="dk1">
+          <a:lumMod val="65000"/>
+          <a:lumOff val="35000"/>
+        </a:schemeClr>
+      </a:solidFill>
+      <a:ln w="9525">
+        <a:solidFill>
+          <a:schemeClr val="tx1">
+            <a:lumMod val="65000"/>
+            <a:lumOff val="35000"/>
+          </a:schemeClr>
+        </a:solidFill>
+      </a:ln>
+    </cs:spPr>
+  </cs:downBar>
+  <cs:dropLine>
+    <cs:lnRef idx="0"/>
+    <cs:fillRef idx="0"/>
+    <cs:effectRef idx="0"/>
+    <cs:fontRef idx="minor">
+      <a:schemeClr val="tx1"/>
+    </cs:fontRef>
+    <cs:spPr>
+      <a:ln w="9525" cap="flat" cmpd="sng" algn="ctr">
+        <a:solidFill>
+          <a:schemeClr val="tx1">
+            <a:lumMod val="35000"/>
+            <a:lumOff val="65000"/>
+          </a:schemeClr>
+        </a:solidFill>
+        <a:round/>
+      </a:ln>
+    </cs:spPr>
+  </cs:dropLine>
+  <cs:errorBar>
+    <cs:lnRef idx="0"/>
+    <cs:fillRef idx="0"/>
+    <cs:effectRef idx="0"/>
+    <cs:fontRef idx="minor">
+      <a:schemeClr val="tx1"/>
+    </cs:fontRef>
+    <cs:spPr>
+      <a:ln w="9525" cap="flat" cmpd="sng" algn="ctr">
+        <a:solidFill>
+          <a:schemeClr val="tx1">
+            <a:lumMod val="65000"/>
+            <a:lumOff val="35000"/>
+          </a:schemeClr>
+        </a:solidFill>
+        <a:round/>
+      </a:ln>
+    </cs:spPr>
+  </cs:errorBar>
+  <cs:floor>
+    <cs:lnRef idx="0"/>
+    <cs:fillRef idx="0"/>
+    <cs:effectRef idx="0"/>
+    <cs:fontRef idx="minor">
+      <a:schemeClr val="tx1"/>
+    </cs:fontRef>
+    <cs:spPr>
+      <a:noFill/>
+      <a:ln>
+        <a:noFill/>
+      </a:ln>
+    </cs:spPr>
+  </cs:floor>
+  <cs:gridlineMajor>
+    <cs:lnRef idx="0"/>
+    <cs:fillRef idx="0"/>
+    <cs:effectRef idx="0"/>
+    <cs:fontRef idx="minor">
+      <a:schemeClr val="tx1"/>
+    </cs:fontRef>
+    <cs:spPr>
+      <a:ln w="9525" cap="flat" cmpd="sng" algn="ctr">
+        <a:solidFill>
+          <a:schemeClr val="tx1">
+            <a:lumMod val="15000"/>
+            <a:lumOff val="85000"/>
+          </a:schemeClr>
+        </a:solidFill>
+        <a:round/>
+      </a:ln>
+    </cs:spPr>
+  </cs:gridlineMajor>
+  <cs:gridlineMinor>
+    <cs:lnRef idx="0"/>
+    <cs:fillRef idx="0"/>
+    <cs:effectRef idx="0"/>
+    <cs:fontRef idx="minor">
+      <a:schemeClr val="tx1"/>
+    </cs:fontRef>
+    <cs:spPr>
+      <a:ln w="9525" cap="flat" cmpd="sng" algn="ctr">
+        <a:solidFill>
+          <a:schemeClr val="tx1">
+            <a:lumMod val="5000"/>
+            <a:lumOff val="95000"/>
+          </a:schemeClr>
+        </a:solidFill>
+        <a:round/>
+      </a:ln>
+    </cs:spPr>
+  </cs:gridlineMinor>
+  <cs:hiLoLine>
+    <cs:lnRef idx="0"/>
+    <cs:fillRef idx="0"/>
+    <cs:effectRef idx="0"/>
+    <cs:fontRef idx="minor">
+      <a:schemeClr val="tx1"/>
+    </cs:fontRef>
+    <cs:spPr>
+      <a:ln w="9525" cap="flat" cmpd="sng" algn="ctr">
+        <a:solidFill>
+          <a:schemeClr val="tx1">
+            <a:lumMod val="75000"/>
+            <a:lumOff val="25000"/>
+          </a:schemeClr>
+        </a:solidFill>
+        <a:round/>
+      </a:ln>
+    </cs:spPr>
+  </cs:hiLoLine>
+  <cs:leaderLine>
+    <cs:lnRef idx="0"/>
+    <cs:fillRef idx="0"/>
+    <cs:effectRef idx="0"/>
+    <cs:fontRef idx="minor">
+      <a:schemeClr val="tx1"/>
+    </cs:fontRef>
+    <cs:spPr>
+      <a:ln w="9525" cap="flat" cmpd="sng" algn="ctr">
+        <a:solidFill>
+          <a:schemeClr val="tx1">
+            <a:lumMod val="35000"/>
+            <a:lumOff val="65000"/>
+          </a:schemeClr>
+        </a:solidFill>
+        <a:round/>
+      </a:ln>
+    </cs:spPr>
+  </cs:leaderLine>
+  <cs:legend>
+    <cs:lnRef idx="0"/>
+    <cs:fillRef idx="0"/>
+    <cs:effectRef idx="0"/>
+    <cs:fontRef idx="minor">
+      <a:schemeClr val="tx1">
+        <a:lumMod val="65000"/>
+        <a:lumOff val="35000"/>
+      </a:schemeClr>
+    </cs:fontRef>
+    <cs:defRPr sz="900" kern="1200"/>
+  </cs:legend>
+  <cs:plotArea mods="allowNoFillOverride allowNoLineOverride">
+    <cs:lnRef idx="0"/>
+    <cs:fillRef idx="0"/>
+    <cs:effectRef idx="0"/>
+    <cs:fontRef idx="minor">
+      <a:schemeClr val="tx1"/>
+    </cs:fontRef>
+  </cs:plotArea>
+  <cs:plotArea3D mods="allowNoFillOverride allowNoLineOverride">
+    <cs:lnRef idx="0"/>
+    <cs:fillRef idx="0"/>
+    <cs:effectRef idx="0"/>
+    <cs:fontRef idx="minor">
+      <a:schemeClr val="tx1"/>
+    </cs:fontRef>
+  </cs:plotArea3D>
+  <cs:seriesAxis>
+    <cs:lnRef idx="0"/>
+    <cs:fillRef idx="0"/>
+    <cs:effectRef idx="0"/>
+    <cs:fontRef idx="minor">
+      <a:schemeClr val="tx1">
+        <a:lumMod val="65000"/>
+        <a:lumOff val="35000"/>
+      </a:schemeClr>
+    </cs:fontRef>
+    <cs:defRPr sz="900" kern="1200"/>
+  </cs:seriesAxis>
+  <cs:seriesLine>
+    <cs:lnRef idx="0"/>
+    <cs:fillRef idx="0"/>
+    <cs:effectRef idx="0"/>
+    <cs:fontRef idx="minor">
+      <a:schemeClr val="tx1"/>
+    </cs:fontRef>
+    <cs:spPr>
+      <a:ln w="9525" cap="flat" cmpd="sng" algn="ctr">
+        <a:solidFill>
+          <a:schemeClr val="tx1">
+            <a:lumMod val="35000"/>
+            <a:lumOff val="65000"/>
+          </a:schemeClr>
+        </a:solidFill>
+        <a:round/>
+      </a:ln>
+    </cs:spPr>
+  </cs:seriesLine>
+  <cs:title>
+    <cs:lnRef idx="0"/>
+    <cs:fillRef idx="0"/>
+    <cs:effectRef idx="0"/>
+    <cs:fontRef idx="minor">
+      <a:schemeClr val="tx1">
+        <a:lumMod val="65000"/>
+        <a:lumOff val="35000"/>
+      </a:schemeClr>
+    </cs:fontRef>
+    <cs:defRPr sz="1400" b="0" kern="1200" spc="0" baseline="0"/>
+  </cs:title>
+  <cs:trendline>
+    <cs:lnRef idx="0">
+      <cs:styleClr val="auto"/>
+    </cs:lnRef>
+    <cs:fillRef idx="0"/>
+    <cs:effectRef idx="0"/>
+    <cs:fontRef idx="minor">
+      <a:schemeClr val="tx1"/>
+    </cs:fontRef>
+    <cs:spPr>
+      <a:ln w="19050" cap="rnd">
+        <a:solidFill>
+          <a:schemeClr val="phClr"/>
+        </a:solidFill>
+        <a:prstDash val="sysDot"/>
+      </a:ln>
+    </cs:spPr>
+  </cs:trendline>
+  <cs:trendlineLabel>
+    <cs:lnRef idx="0"/>
+    <cs:fillRef idx="0"/>
+    <cs:effectRef idx="0"/>
+    <cs:fontRef idx="minor">
+      <a:schemeClr val="tx1">
+        <a:lumMod val="65000"/>
+        <a:lumOff val="35000"/>
+      </a:schemeClr>
+    </cs:fontRef>
+    <cs:defRPr sz="900" kern="1200"/>
+  </cs:trendlineLabel>
+  <cs:upBar>
+    <cs:lnRef idx="0"/>
+    <cs:fillRef idx="0"/>
+    <cs:effectRef idx="0"/>
+    <cs:fontRef idx="minor">
+      <a:schemeClr val="dk1"/>
+    </cs:fontRef>
+    <cs:spPr>
+      <a:solidFill>
+        <a:schemeClr val="lt1"/>
+      </a:solidFill>
+      <a:ln w="9525">
+        <a:solidFill>
+          <a:schemeClr val="tx1">
+            <a:lumMod val="15000"/>
+            <a:lumOff val="85000"/>
+          </a:schemeClr>
+        </a:solidFill>
+      </a:ln>
+    </cs:spPr>
+  </cs:upBar>
+  <cs:valueAxis>
+    <cs:lnRef idx="0"/>
+    <cs:fillRef idx="0"/>
+    <cs:effectRef idx="0"/>
+    <cs:fontRef idx="minor">
+      <a:schemeClr val="tx1">
+        <a:lumMod val="65000"/>
+        <a:lumOff val="35000"/>
+      </a:schemeClr>
+    </cs:fontRef>
+    <cs:defRPr sz="900" kern="1200"/>
+  </cs:valueAxis>
+  <cs:wall>
+    <cs:lnRef idx="0"/>
+    <cs:fillRef idx="0"/>
+    <cs:effectRef idx="0"/>
+    <cs:fontRef idx="minor">
+      <a:schemeClr val="tx1"/>
+    </cs:fontRef>
+    <cs:spPr>
+      <a:noFill/>
+      <a:ln>
+        <a:noFill/>
+      </a:ln>
+    </cs:spPr>
+  </cs:wall>
+</cs:chartStyle>
+</file>
+
+<file path=ppt/charts/style3.xml><?xml version="1.0" encoding="utf-8"?>
+<cs:chartStyle xmlns:cs="http://schemas.microsoft.com/office/drawing/2012/chartStyle" xmlns:a="http://schemas.openxmlformats.org/drawingml/2006/main" id="227">
+  <cs:axisTitle>
+    <cs:lnRef idx="0"/>
+    <cs:fillRef idx="0"/>
+    <cs:effectRef idx="0"/>
+    <cs:fontRef idx="minor">
+      <a:schemeClr val="tx1">
+        <a:lumMod val="65000"/>
+        <a:lumOff val="35000"/>
+      </a:schemeClr>
+    </cs:fontRef>
+    <cs:defRPr sz="1000" kern="1200"/>
+  </cs:axisTitle>
+  <cs:categoryAxis>
+    <cs:lnRef idx="0"/>
+    <cs:fillRef idx="0"/>
+    <cs:effectRef idx="0"/>
+    <cs:fontRef idx="minor">
+      <a:schemeClr val="tx1">
+        <a:lumMod val="65000"/>
+        <a:lumOff val="35000"/>
+      </a:schemeClr>
+    </cs:fontRef>
+    <cs:spPr>
+      <a:ln w="9525" cap="flat" cmpd="sng" algn="ctr">
+        <a:solidFill>
+          <a:schemeClr val="tx1">
+            <a:lumMod val="15000"/>
+            <a:lumOff val="85000"/>
+          </a:schemeClr>
+        </a:solidFill>
+        <a:round/>
+      </a:ln>
+    </cs:spPr>
+    <cs:defRPr sz="900" kern="1200"/>
+  </cs:categoryAxis>
+  <cs:chartArea mods="allowNoFillOverride allowNoLineOverride">
+    <cs:lnRef idx="0"/>
+    <cs:fillRef idx="0"/>
+    <cs:effectRef idx="0"/>
+    <cs:fontRef idx="minor">
+      <a:schemeClr val="tx1"/>
+    </cs:fontRef>
+    <cs:spPr>
+      <a:solidFill>
+        <a:schemeClr val="bg1"/>
+      </a:solidFill>
+      <a:ln w="9525" cap="flat" cmpd="sng" algn="ctr">
+        <a:solidFill>
+          <a:schemeClr val="tx1">
+            <a:lumMod val="15000"/>
+            <a:lumOff val="85000"/>
+          </a:schemeClr>
+        </a:solidFill>
+        <a:round/>
+      </a:ln>
+    </cs:spPr>
+    <cs:defRPr sz="1000" kern="1200"/>
+  </cs:chartArea>
+  <cs:dataLabel>
+    <cs:lnRef idx="0"/>
+    <cs:fillRef idx="0"/>
+    <cs:effectRef idx="0"/>
+    <cs:fontRef idx="minor">
+      <a:schemeClr val="tx1">
+        <a:lumMod val="75000"/>
+        <a:lumOff val="25000"/>
+      </a:schemeClr>
+    </cs:fontRef>
+    <cs:defRPr sz="900" kern="1200"/>
+  </cs:dataLabel>
+  <cs:dataLabelCallout>
+    <cs:lnRef idx="0"/>
+    <cs:fillRef idx="0"/>
+    <cs:effectRef idx="0"/>
+    <cs:fontRef idx="minor">
+      <a:schemeClr val="dk1">
+        <a:lumMod val="65000"/>
+        <a:lumOff val="35000"/>
+      </a:schemeClr>
+    </cs:fontRef>
+    <cs:spPr>
+      <a:solidFill>
+        <a:schemeClr val="lt1"/>
+      </a:solidFill>
+      <a:ln>
+        <a:solidFill>
+          <a:schemeClr val="dk1">
+            <a:lumMod val="25000"/>
+            <a:lumOff val="75000"/>
+          </a:schemeClr>
+        </a:solidFill>
+      </a:ln>
+    </cs:spPr>
+    <cs:defRPr sz="900" kern="1200"/>
+    <cs:bodyPr rot="0" spcFirstLastPara="1" vertOverflow="clip" horzOverflow="clip" vert="horz" wrap="square" lIns="36576" tIns="18288" rIns="36576" bIns="18288" anchor="ctr" anchorCtr="1">
+      <a:spAutoFit/>
+    </cs:bodyPr>
+  </cs:dataLabelCallout>
+  <cs:dataPoint>
+    <cs:lnRef idx="0"/>
+    <cs:fillRef idx="1">
+      <cs:styleClr val="auto"/>
+    </cs:fillRef>
+    <cs:effectRef idx="0"/>
+    <cs:fontRef idx="minor">
+      <a:schemeClr val="tx1"/>
+    </cs:fontRef>
+    <cs:spPr>
+      <a:solidFill>
+        <a:schemeClr val="phClr"/>
+      </a:solidFill>
+    </cs:spPr>
+  </cs:dataPoint>
+  <cs:dataPoint3D>
+    <cs:lnRef idx="0"/>
+    <cs:fillRef idx="1">
+      <cs:styleClr val="auto"/>
+    </cs:fillRef>
+    <cs:effectRef idx="0"/>
+    <cs:fontRef idx="minor">
+      <a:schemeClr val="tx1"/>
+    </cs:fontRef>
+    <cs:spPr>
+      <a:solidFill>
+        <a:schemeClr val="phClr"/>
+      </a:solidFill>
+    </cs:spPr>
+  </cs:dataPoint3D>
+  <cs:dataPointLine>
+    <cs:lnRef idx="0">
+      <cs:styleClr val="auto"/>
+    </cs:lnRef>
+    <cs:fillRef idx="1"/>
+    <cs:effectRef idx="0"/>
+    <cs:fontRef idx="minor">
+      <a:schemeClr val="tx1"/>
+    </cs:fontRef>
+    <cs:spPr>
+      <a:ln w="28575" cap="rnd">
+        <a:solidFill>
+          <a:schemeClr val="phClr"/>
+        </a:solidFill>
+        <a:round/>
+      </a:ln>
+    </cs:spPr>
+  </cs:dataPointLine>
+  <cs:dataPointMarker>
+    <cs:lnRef idx="0">
+      <cs:styleClr val="auto"/>
+    </cs:lnRef>
+    <cs:fillRef idx="1">
+      <cs:styleClr val="auto"/>
+    </cs:fillRef>
+    <cs:effectRef idx="0"/>
+    <cs:fontRef idx="minor">
+      <a:schemeClr val="tx1"/>
+    </cs:fontRef>
+    <cs:spPr>
+      <a:solidFill>
+        <a:schemeClr val="phClr"/>
+      </a:solidFill>
+      <a:ln w="9525">
+        <a:solidFill>
+          <a:schemeClr val="phClr"/>
+        </a:solidFill>
+      </a:ln>
+    </cs:spPr>
+  </cs:dataPointMarker>
+  <cs:dataPointMarkerLayout symbol="circle" size="5"/>
+  <cs:dataPointWireframe>
+    <cs:lnRef idx="0">
+      <cs:styleClr val="auto"/>
+    </cs:lnRef>
+    <cs:fillRef idx="1"/>
+    <cs:effectRef idx="0"/>
+    <cs:fontRef idx="minor">
+      <a:schemeClr val="tx1"/>
+    </cs:fontRef>
+    <cs:spPr>
+      <a:ln w="9525" cap="rnd">
+        <a:solidFill>
+          <a:schemeClr val="phClr"/>
+        </a:solidFill>
+        <a:round/>
+      </a:ln>
+    </cs:spPr>
+  </cs:dataPointWireframe>
+  <cs:dataTable>
+    <cs:lnRef idx="0"/>
+    <cs:fillRef idx="0"/>
+    <cs:effectRef idx="0"/>
+    <cs:fontRef idx="minor">
+      <a:schemeClr val="tx1">
+        <a:lumMod val="65000"/>
+        <a:lumOff val="35000"/>
+      </a:schemeClr>
+    </cs:fontRef>
+    <cs:spPr>
+      <a:noFill/>
+      <a:ln w="9525" cap="flat" cmpd="sng" algn="ctr">
+        <a:solidFill>
+          <a:schemeClr val="tx1">
+            <a:lumMod val="15000"/>
+            <a:lumOff val="85000"/>
+          </a:schemeClr>
+        </a:solidFill>
+        <a:round/>
+      </a:ln>
+    </cs:spPr>
+    <cs:defRPr sz="900" kern="1200"/>
+  </cs:dataTable>
+  <cs:downBar>
+    <cs:lnRef idx="0"/>
+    <cs:fillRef idx="0"/>
+    <cs:effectRef idx="0"/>
+    <cs:fontRef idx="minor">
+      <a:schemeClr val="dk1"/>
+    </cs:fontRef>
+    <cs:spPr>
+      <a:solidFill>
+        <a:schemeClr val="dk1">
+          <a:lumMod val="65000"/>
+          <a:lumOff val="35000"/>
+        </a:schemeClr>
+      </a:solidFill>
+      <a:ln w="9525">
+        <a:solidFill>
+          <a:schemeClr val="tx1">
+            <a:lumMod val="65000"/>
+            <a:lumOff val="35000"/>
+          </a:schemeClr>
+        </a:solidFill>
+      </a:ln>
+    </cs:spPr>
+  </cs:downBar>
+  <cs:dropLine>
+    <cs:lnRef idx="0"/>
+    <cs:fillRef idx="0"/>
+    <cs:effectRef idx="0"/>
+    <cs:fontRef idx="minor">
+      <a:schemeClr val="tx1"/>
+    </cs:fontRef>
+    <cs:spPr>
+      <a:ln w="9525" cap="flat" cmpd="sng" algn="ctr">
+        <a:solidFill>
+          <a:schemeClr val="tx1">
+            <a:lumMod val="35000"/>
+            <a:lumOff val="65000"/>
+          </a:schemeClr>
+        </a:solidFill>
+        <a:round/>
+      </a:ln>
+    </cs:spPr>
+  </cs:dropLine>
+  <cs:errorBar>
+    <cs:lnRef idx="0"/>
+    <cs:fillRef idx="0"/>
+    <cs:effectRef idx="0"/>
+    <cs:fontRef idx="minor">
+      <a:schemeClr val="tx1"/>
+    </cs:fontRef>
+    <cs:spPr>
+      <a:ln w="9525" cap="flat" cmpd="sng" algn="ctr">
+        <a:solidFill>
+          <a:schemeClr val="tx1">
+            <a:lumMod val="65000"/>
+            <a:lumOff val="35000"/>
+          </a:schemeClr>
+        </a:solidFill>
+        <a:round/>
+      </a:ln>
+    </cs:spPr>
+  </cs:errorBar>
+  <cs:floor>
+    <cs:lnRef idx="0"/>
+    <cs:fillRef idx="0"/>
+    <cs:effectRef idx="0"/>
+    <cs:fontRef idx="minor">
+      <a:schemeClr val="tx1"/>
+    </cs:fontRef>
+    <cs:spPr>
+      <a:noFill/>
+      <a:ln>
+        <a:noFill/>
+      </a:ln>
+    </cs:spPr>
+  </cs:floor>
+  <cs:gridlineMajor>
+    <cs:lnRef idx="0"/>
+    <cs:fillRef idx="0"/>
+    <cs:effectRef idx="0"/>
+    <cs:fontRef idx="minor">
+      <a:schemeClr val="tx1"/>
+    </cs:fontRef>
+    <cs:spPr>
+      <a:ln w="9525" cap="flat" cmpd="sng" algn="ctr">
+        <a:solidFill>
+          <a:schemeClr val="tx1">
+            <a:lumMod val="15000"/>
+            <a:lumOff val="85000"/>
+          </a:schemeClr>
+        </a:solidFill>
+        <a:round/>
+      </a:ln>
+    </cs:spPr>
+  </cs:gridlineMajor>
+  <cs:gridlineMinor>
+    <cs:lnRef idx="0"/>
+    <cs:fillRef idx="0"/>
+    <cs:effectRef idx="0"/>
+    <cs:fontRef idx="minor">
+      <a:schemeClr val="tx1"/>
+    </cs:fontRef>
+    <cs:spPr>
+      <a:ln w="9525" cap="flat" cmpd="sng" algn="ctr">
+        <a:solidFill>
+          <a:schemeClr val="tx1">
+            <a:lumMod val="5000"/>
+            <a:lumOff val="95000"/>
+          </a:schemeClr>
+        </a:solidFill>
+        <a:round/>
+      </a:ln>
+    </cs:spPr>
+  </cs:gridlineMinor>
+  <cs:hiLoLine>
+    <cs:lnRef idx="0"/>
+    <cs:fillRef idx="0"/>
+    <cs:effectRef idx="0"/>
+    <cs:fontRef idx="minor">
+      <a:schemeClr val="tx1"/>
+    </cs:fontRef>
+    <cs:spPr>
+      <a:ln w="9525" cap="flat" cmpd="sng" algn="ctr">
+        <a:solidFill>
+          <a:schemeClr val="tx1">
+            <a:lumMod val="75000"/>
+            <a:lumOff val="25000"/>
+          </a:schemeClr>
+        </a:solidFill>
+        <a:round/>
+      </a:ln>
+    </cs:spPr>
+  </cs:hiLoLine>
+  <cs:leaderLine>
+    <cs:lnRef idx="0"/>
+    <cs:fillRef idx="0"/>
+    <cs:effectRef idx="0"/>
+    <cs:fontRef idx="minor">
+      <a:schemeClr val="tx1"/>
+    </cs:fontRef>
+    <cs:spPr>
+      <a:ln w="9525" cap="flat" cmpd="sng" algn="ctr">
+        <a:solidFill>
+          <a:schemeClr val="tx1">
+            <a:lumMod val="35000"/>
+            <a:lumOff val="65000"/>
+          </a:schemeClr>
+        </a:solidFill>
+        <a:round/>
+      </a:ln>
+    </cs:spPr>
+  </cs:leaderLine>
+  <cs:legend>
+    <cs:lnRef idx="0"/>
+    <cs:fillRef idx="0"/>
+    <cs:effectRef idx="0"/>
+    <cs:fontRef idx="minor">
+      <a:schemeClr val="tx1">
+        <a:lumMod val="65000"/>
+        <a:lumOff val="35000"/>
+      </a:schemeClr>
+    </cs:fontRef>
+    <cs:defRPr sz="900" kern="1200"/>
+  </cs:legend>
+  <cs:plotArea mods="allowNoFillOverride allowNoLineOverride">
+    <cs:lnRef idx="0"/>
+    <cs:fillRef idx="0"/>
+    <cs:effectRef idx="0"/>
+    <cs:fontRef idx="minor">
+      <a:schemeClr val="tx1"/>
+    </cs:fontRef>
+  </cs:plotArea>
+  <cs:plotArea3D mods="allowNoFillOverride allowNoLineOverride">
+    <cs:lnRef idx="0"/>
+    <cs:fillRef idx="0"/>
+    <cs:effectRef idx="0"/>
+    <cs:fontRef idx="minor">
+      <a:schemeClr val="tx1"/>
+    </cs:fontRef>
+  </cs:plotArea3D>
+  <cs:seriesAxis>
+    <cs:lnRef idx="0"/>
+    <cs:fillRef idx="0"/>
+    <cs:effectRef idx="0"/>
+    <cs:fontRef idx="minor">
+      <a:schemeClr val="tx1">
+        <a:lumMod val="65000"/>
+        <a:lumOff val="35000"/>
+      </a:schemeClr>
+    </cs:fontRef>
+    <cs:defRPr sz="900" kern="1200"/>
+  </cs:seriesAxis>
+  <cs:seriesLine>
+    <cs:lnRef idx="0"/>
+    <cs:fillRef idx="0"/>
+    <cs:effectRef idx="0"/>
+    <cs:fontRef idx="minor">
+      <a:schemeClr val="tx1"/>
+    </cs:fontRef>
+    <cs:spPr>
+      <a:ln w="9525" cap="flat" cmpd="sng" algn="ctr">
+        <a:solidFill>
+          <a:schemeClr val="tx1">
+            <a:lumMod val="35000"/>
+            <a:lumOff val="65000"/>
+          </a:schemeClr>
+        </a:solidFill>
+        <a:round/>
+      </a:ln>
+    </cs:spPr>
+  </cs:seriesLine>
+  <cs:title>
+    <cs:lnRef idx="0"/>
+    <cs:fillRef idx="0"/>
+    <cs:effectRef idx="0"/>
+    <cs:fontRef idx="minor">
+      <a:schemeClr val="tx1">
+        <a:lumMod val="65000"/>
+        <a:lumOff val="35000"/>
+      </a:schemeClr>
+    </cs:fontRef>
+    <cs:defRPr sz="1400" b="0" kern="1200" spc="0" baseline="0"/>
+  </cs:title>
+  <cs:trendline>
+    <cs:lnRef idx="0">
+      <cs:styleClr val="auto"/>
+    </cs:lnRef>
+    <cs:fillRef idx="0"/>
+    <cs:effectRef idx="0"/>
+    <cs:fontRef idx="minor">
+      <a:schemeClr val="tx1"/>
+    </cs:fontRef>
+    <cs:spPr>
+      <a:ln w="19050" cap="rnd">
+        <a:solidFill>
+          <a:schemeClr val="phClr"/>
+        </a:solidFill>
+        <a:prstDash val="sysDot"/>
+      </a:ln>
+    </cs:spPr>
+  </cs:trendline>
+  <cs:trendlineLabel>
+    <cs:lnRef idx="0"/>
+    <cs:fillRef idx="0"/>
+    <cs:effectRef idx="0"/>
+    <cs:fontRef idx="minor">
+      <a:schemeClr val="tx1">
+        <a:lumMod val="65000"/>
+        <a:lumOff val="35000"/>
+      </a:schemeClr>
+    </cs:fontRef>
+    <cs:defRPr sz="900" kern="1200"/>
+  </cs:trendlineLabel>
+  <cs:upBar>
+    <cs:lnRef idx="0"/>
+    <cs:fillRef idx="0"/>
+    <cs:effectRef idx="0"/>
+    <cs:fontRef idx="minor">
+      <a:schemeClr val="dk1"/>
+    </cs:fontRef>
+    <cs:spPr>
+      <a:solidFill>
+        <a:schemeClr val="lt1"/>
+      </a:solidFill>
+      <a:ln w="9525">
+        <a:solidFill>
+          <a:schemeClr val="tx1">
+            <a:lumMod val="15000"/>
+            <a:lumOff val="85000"/>
+          </a:schemeClr>
+        </a:solidFill>
+      </a:ln>
+    </cs:spPr>
+  </cs:upBar>
+  <cs:valueAxis>
+    <cs:lnRef idx="0"/>
+    <cs:fillRef idx="0"/>
+    <cs:effectRef idx="0"/>
+    <cs:fontRef idx="minor">
+      <a:schemeClr val="tx1">
+        <a:lumMod val="65000"/>
+        <a:lumOff val="35000"/>
+      </a:schemeClr>
+    </cs:fontRef>
+    <cs:defRPr sz="900" kern="1200"/>
+  </cs:valueAxis>
+  <cs:wall>
+    <cs:lnRef idx="0"/>
+    <cs:fillRef idx="0"/>
+    <cs:effectRef idx="0"/>
+    <cs:fontRef idx="minor">
+      <a:schemeClr val="tx1"/>
+    </cs:fontRef>
+    <cs:spPr>
+      <a:noFill/>
+      <a:ln>
+        <a:noFill/>
+      </a:ln>
+    </cs:spPr>
+  </cs:wall>
+</cs:chartStyle>
+</file>
+
+<file path=ppt/charts/style4.xml><?xml version="1.0" encoding="utf-8"?>
+<cs:chartStyle xmlns:cs="http://schemas.microsoft.com/office/drawing/2012/chartStyle" xmlns:a="http://schemas.openxmlformats.org/drawingml/2006/main" id="227">
+  <cs:axisTitle>
+    <cs:lnRef idx="0"/>
+    <cs:fillRef idx="0"/>
+    <cs:effectRef idx="0"/>
+    <cs:fontRef idx="minor">
+      <a:schemeClr val="tx1">
+        <a:lumMod val="65000"/>
+        <a:lumOff val="35000"/>
+      </a:schemeClr>
+    </cs:fontRef>
+    <cs:defRPr sz="1000" kern="1200"/>
+  </cs:axisTitle>
+  <cs:categoryAxis>
+    <cs:lnRef idx="0"/>
+    <cs:fillRef idx="0"/>
+    <cs:effectRef idx="0"/>
+    <cs:fontRef idx="minor">
+      <a:schemeClr val="tx1">
+        <a:lumMod val="65000"/>
+        <a:lumOff val="35000"/>
+      </a:schemeClr>
+    </cs:fontRef>
+    <cs:spPr>
+      <a:ln w="9525" cap="flat" cmpd="sng" algn="ctr">
+        <a:solidFill>
+          <a:schemeClr val="tx1">
+            <a:lumMod val="15000"/>
+            <a:lumOff val="85000"/>
+          </a:schemeClr>
+        </a:solidFill>
+        <a:round/>
+      </a:ln>
+    </cs:spPr>
+    <cs:defRPr sz="900" kern="1200"/>
+  </cs:categoryAxis>
+  <cs:chartArea mods="allowNoFillOverride allowNoLineOverride">
+    <cs:lnRef idx="0"/>
+    <cs:fillRef idx="0"/>
+    <cs:effectRef idx="0"/>
+    <cs:fontRef idx="minor">
+      <a:schemeClr val="tx1"/>
+    </cs:fontRef>
+    <cs:spPr>
+      <a:solidFill>
+        <a:schemeClr val="bg1"/>
+      </a:solidFill>
+      <a:ln w="9525" cap="flat" cmpd="sng" algn="ctr">
+        <a:solidFill>
+          <a:schemeClr val="tx1">
+            <a:lumMod val="15000"/>
+            <a:lumOff val="85000"/>
+          </a:schemeClr>
+        </a:solidFill>
+        <a:round/>
+      </a:ln>
+    </cs:spPr>
+    <cs:defRPr sz="1000" kern="1200"/>
+  </cs:chartArea>
+  <cs:dataLabel>
+    <cs:lnRef idx="0"/>
+    <cs:fillRef idx="0"/>
+    <cs:effectRef idx="0"/>
+    <cs:fontRef idx="minor">
+      <a:schemeClr val="tx1">
+        <a:lumMod val="75000"/>
+        <a:lumOff val="25000"/>
+      </a:schemeClr>
+    </cs:fontRef>
+    <cs:defRPr sz="900" kern="1200"/>
+  </cs:dataLabel>
+  <cs:dataLabelCallout>
+    <cs:lnRef idx="0"/>
+    <cs:fillRef idx="0"/>
+    <cs:effectRef idx="0"/>
+    <cs:fontRef idx="minor">
+      <a:schemeClr val="dk1">
+        <a:lumMod val="65000"/>
+        <a:lumOff val="35000"/>
+      </a:schemeClr>
+    </cs:fontRef>
+    <cs:spPr>
+      <a:solidFill>
+        <a:schemeClr val="lt1"/>
+      </a:solidFill>
+      <a:ln>
+        <a:solidFill>
+          <a:schemeClr val="dk1">
+            <a:lumMod val="25000"/>
+            <a:lumOff val="75000"/>
+          </a:schemeClr>
+        </a:solidFill>
+      </a:ln>
+    </cs:spPr>
+    <cs:defRPr sz="900" kern="1200"/>
+    <cs:bodyPr rot="0" spcFirstLastPara="1" vertOverflow="clip" horzOverflow="clip" vert="horz" wrap="square" lIns="36576" tIns="18288" rIns="36576" bIns="18288" anchor="ctr" anchorCtr="1">
+      <a:spAutoFit/>
+    </cs:bodyPr>
+  </cs:dataLabelCallout>
+  <cs:dataPoint>
+    <cs:lnRef idx="0"/>
+    <cs:fillRef idx="1">
+      <cs:styleClr val="auto"/>
+    </cs:fillRef>
+    <cs:effectRef idx="0"/>
+    <cs:fontRef idx="minor">
+      <a:schemeClr val="tx1"/>
+    </cs:fontRef>
+    <cs:spPr>
+      <a:solidFill>
+        <a:schemeClr val="phClr"/>
+      </a:solidFill>
+    </cs:spPr>
+  </cs:dataPoint>
+  <cs:dataPoint3D>
+    <cs:lnRef idx="0"/>
+    <cs:fillRef idx="1">
+      <cs:styleClr val="auto"/>
+    </cs:fillRef>
+    <cs:effectRef idx="0"/>
+    <cs:fontRef idx="minor">
+      <a:schemeClr val="tx1"/>
+    </cs:fontRef>
+    <cs:spPr>
+      <a:solidFill>
+        <a:schemeClr val="phClr"/>
+      </a:solidFill>
+    </cs:spPr>
+  </cs:dataPoint3D>
+  <cs:dataPointLine>
+    <cs:lnRef idx="0">
+      <cs:styleClr val="auto"/>
+    </cs:lnRef>
+    <cs:fillRef idx="1"/>
+    <cs:effectRef idx="0"/>
+    <cs:fontRef idx="minor">
+      <a:schemeClr val="tx1"/>
+    </cs:fontRef>
+    <cs:spPr>
+      <a:ln w="28575" cap="rnd">
+        <a:solidFill>
+          <a:schemeClr val="phClr"/>
+        </a:solidFill>
+        <a:round/>
+      </a:ln>
+    </cs:spPr>
+  </cs:dataPointLine>
+  <cs:dataPointMarker>
+    <cs:lnRef idx="0">
+      <cs:styleClr val="auto"/>
+    </cs:lnRef>
+    <cs:fillRef idx="1">
+      <cs:styleClr val="auto"/>
+    </cs:fillRef>
+    <cs:effectRef idx="0"/>
+    <cs:fontRef idx="minor">
+      <a:schemeClr val="tx1"/>
+    </cs:fontRef>
+    <cs:spPr>
+      <a:solidFill>
+        <a:schemeClr val="phClr"/>
+      </a:solidFill>
+      <a:ln w="9525">
+        <a:solidFill>
+          <a:schemeClr val="phClr"/>
+        </a:solidFill>
+      </a:ln>
+    </cs:spPr>
+  </cs:dataPointMarker>
+  <cs:dataPointMarkerLayout symbol="circle" size="5"/>
+  <cs:dataPointWireframe>
+    <cs:lnRef idx="0">
+      <cs:styleClr val="auto"/>
+    </cs:lnRef>
+    <cs:fillRef idx="1"/>
+    <cs:effectRef idx="0"/>
+    <cs:fontRef idx="minor">
+      <a:schemeClr val="tx1"/>
+    </cs:fontRef>
+    <cs:spPr>
+      <a:ln w="9525" cap="rnd">
+        <a:solidFill>
+          <a:schemeClr val="phClr"/>
+        </a:solidFill>
+        <a:round/>
+      </a:ln>
+    </cs:spPr>
+  </cs:dataPointWireframe>
+  <cs:dataTable>
+    <cs:lnRef idx="0"/>
+    <cs:fillRef idx="0"/>
+    <cs:effectRef idx="0"/>
+    <cs:fontRef idx="minor">
+      <a:schemeClr val="tx1">
+        <a:lumMod val="65000"/>
+        <a:lumOff val="35000"/>
+      </a:schemeClr>
+    </cs:fontRef>
+    <cs:spPr>
+      <a:noFill/>
+      <a:ln w="9525" cap="flat" cmpd="sng" algn="ctr">
+        <a:solidFill>
+          <a:schemeClr val="tx1">
+            <a:lumMod val="15000"/>
+            <a:lumOff val="85000"/>
+          </a:schemeClr>
+        </a:solidFill>
+        <a:round/>
+      </a:ln>
+    </cs:spPr>
+    <cs:defRPr sz="900" kern="1200"/>
+  </cs:dataTable>
+  <cs:downBar>
+    <cs:lnRef idx="0"/>
+    <cs:fillRef idx="0"/>
+    <cs:effectRef idx="0"/>
+    <cs:fontRef idx="minor">
+      <a:schemeClr val="dk1"/>
+    </cs:fontRef>
+    <cs:spPr>
+      <a:solidFill>
+        <a:schemeClr val="dk1">
+          <a:lumMod val="65000"/>
+          <a:lumOff val="35000"/>
+        </a:schemeClr>
+      </a:solidFill>
+      <a:ln w="9525">
+        <a:solidFill>
+          <a:schemeClr val="tx1">
+            <a:lumMod val="65000"/>
+            <a:lumOff val="35000"/>
+          </a:schemeClr>
+        </a:solidFill>
+      </a:ln>
+    </cs:spPr>
+  </cs:downBar>
+  <cs:dropLine>
+    <cs:lnRef idx="0"/>
+    <cs:fillRef idx="0"/>
+    <cs:effectRef idx="0"/>
+    <cs:fontRef idx="minor">
+      <a:schemeClr val="tx1"/>
+    </cs:fontRef>
+    <cs:spPr>
+      <a:ln w="9525" cap="flat" cmpd="sng" algn="ctr">
+        <a:solidFill>
+          <a:schemeClr val="tx1">
+            <a:lumMod val="35000"/>
+            <a:lumOff val="65000"/>
+          </a:schemeClr>
+        </a:solidFill>
+        <a:round/>
+      </a:ln>
+    </cs:spPr>
+  </cs:dropLine>
+  <cs:errorBar>
+    <cs:lnRef idx="0"/>
+    <cs:fillRef idx="0"/>
+    <cs:effectRef idx="0"/>
+    <cs:fontRef idx="minor">
+      <a:schemeClr val="tx1"/>
+    </cs:fontRef>
+    <cs:spPr>
+      <a:ln w="9525" cap="flat" cmpd="sng" algn="ctr">
+        <a:solidFill>
+          <a:schemeClr val="tx1">
+            <a:lumMod val="65000"/>
+            <a:lumOff val="35000"/>
+          </a:schemeClr>
+        </a:solidFill>
+        <a:round/>
+      </a:ln>
+    </cs:spPr>
+  </cs:errorBar>
+  <cs:floor>
+    <cs:lnRef idx="0"/>
+    <cs:fillRef idx="0"/>
+    <cs:effectRef idx="0"/>
+    <cs:fontRef idx="minor">
+      <a:schemeClr val="tx1"/>
+    </cs:fontRef>
+    <cs:spPr>
+      <a:noFill/>
+      <a:ln>
+        <a:noFill/>
+      </a:ln>
+    </cs:spPr>
+  </cs:floor>
+  <cs:gridlineMajor>
+    <cs:lnRef idx="0"/>
+    <cs:fillRef idx="0"/>
+    <cs:effectRef idx="0"/>
+    <cs:fontRef idx="minor">
+      <a:schemeClr val="tx1"/>
+    </cs:fontRef>
+    <cs:spPr>
+      <a:ln w="9525" cap="flat" cmpd="sng" algn="ctr">
+        <a:solidFill>
+          <a:schemeClr val="tx1">
+            <a:lumMod val="15000"/>
+            <a:lumOff val="85000"/>
+          </a:schemeClr>
+        </a:solidFill>
+        <a:round/>
+      </a:ln>
+    </cs:spPr>
+  </cs:gridlineMajor>
+  <cs:gridlineMinor>
+    <cs:lnRef idx="0"/>
+    <cs:fillRef idx="0"/>
+    <cs:effectRef idx="0"/>
+    <cs:fontRef idx="minor">
+      <a:schemeClr val="tx1"/>
+    </cs:fontRef>
+    <cs:spPr>
+      <a:ln w="9525" cap="flat" cmpd="sng" algn="ctr">
+        <a:solidFill>
+          <a:schemeClr val="tx1">
+            <a:lumMod val="5000"/>
+            <a:lumOff val="95000"/>
+          </a:schemeClr>
+        </a:solidFill>
+        <a:round/>
+      </a:ln>
+    </cs:spPr>
+  </cs:gridlineMinor>
+  <cs:hiLoLine>
+    <cs:lnRef idx="0"/>
+    <cs:fillRef idx="0"/>
+    <cs:effectRef idx="0"/>
+    <cs:fontRef idx="minor">
+      <a:schemeClr val="tx1"/>
+    </cs:fontRef>
+    <cs:spPr>
+      <a:ln w="9525" cap="flat" cmpd="sng" algn="ctr">
+        <a:solidFill>
+          <a:schemeClr val="tx1">
+            <a:lumMod val="75000"/>
+            <a:lumOff val="25000"/>
+          </a:schemeClr>
+        </a:solidFill>
+        <a:round/>
+      </a:ln>
+    </cs:spPr>
+  </cs:hiLoLine>
+  <cs:leaderLine>
+    <cs:lnRef idx="0"/>
+    <cs:fillRef idx="0"/>
+    <cs:effectRef idx="0"/>
+    <cs:fontRef idx="minor">
+      <a:schemeClr val="tx1"/>
+    </cs:fontRef>
+    <cs:spPr>
+      <a:ln w="9525" cap="flat" cmpd="sng" algn="ctr">
+        <a:solidFill>
+          <a:schemeClr val="tx1">
+            <a:lumMod val="35000"/>
+            <a:lumOff val="65000"/>
+          </a:schemeClr>
+        </a:solidFill>
+        <a:round/>
+      </a:ln>
+    </cs:spPr>
+  </cs:leaderLine>
+  <cs:legend>
+    <cs:lnRef idx="0"/>
+    <cs:fillRef idx="0"/>
+    <cs:effectRef idx="0"/>
+    <cs:fontRef idx="minor">
+      <a:schemeClr val="tx1">
+        <a:lumMod val="65000"/>
+        <a:lumOff val="35000"/>
+      </a:schemeClr>
+    </cs:fontRef>
+    <cs:defRPr sz="900" kern="1200"/>
+  </cs:legend>
+  <cs:plotArea mods="allowNoFillOverride allowNoLineOverride">
+    <cs:lnRef idx="0"/>
+    <cs:fillRef idx="0"/>
+    <cs:effectRef idx="0"/>
+    <cs:fontRef idx="minor">
+      <a:schemeClr val="tx1"/>
+    </cs:fontRef>
+  </cs:plotArea>
+  <cs:plotArea3D mods="allowNoFillOverride allowNoLineOverride">
+    <cs:lnRef idx="0"/>
+    <cs:fillRef idx="0"/>
+    <cs:effectRef idx="0"/>
+    <cs:fontRef idx="minor">
+      <a:schemeClr val="tx1"/>
+    </cs:fontRef>
+  </cs:plotArea3D>
+  <cs:seriesAxis>
+    <cs:lnRef idx="0"/>
+    <cs:fillRef idx="0"/>
+    <cs:effectRef idx="0"/>
+    <cs:fontRef idx="minor">
+      <a:schemeClr val="tx1">
+        <a:lumMod val="65000"/>
+        <a:lumOff val="35000"/>
+      </a:schemeClr>
+    </cs:fontRef>
+    <cs:defRPr sz="900" kern="1200"/>
+  </cs:seriesAxis>
+  <cs:seriesLine>
+    <cs:lnRef idx="0"/>
+    <cs:fillRef idx="0"/>
+    <cs:effectRef idx="0"/>
+    <cs:fontRef idx="minor">
+      <a:schemeClr val="tx1"/>
+    </cs:fontRef>
+    <cs:spPr>
+      <a:ln w="9525" cap="flat" cmpd="sng" algn="ctr">
+        <a:solidFill>
+          <a:schemeClr val="tx1">
+            <a:lumMod val="35000"/>
+            <a:lumOff val="65000"/>
+          </a:schemeClr>
+        </a:solidFill>
+        <a:round/>
+      </a:ln>
+    </cs:spPr>
+  </cs:seriesLine>
+  <cs:title>
+    <cs:lnRef idx="0"/>
+    <cs:fillRef idx="0"/>
+    <cs:effectRef idx="0"/>
+    <cs:fontRef idx="minor">
+      <a:schemeClr val="tx1">
+        <a:lumMod val="65000"/>
+        <a:lumOff val="35000"/>
+      </a:schemeClr>
+    </cs:fontRef>
+    <cs:defRPr sz="1400" b="0" kern="1200" spc="0" baseline="0"/>
+  </cs:title>
+  <cs:trendline>
+    <cs:lnRef idx="0">
+      <cs:styleClr val="auto"/>
+    </cs:lnRef>
+    <cs:fillRef idx="0"/>
+    <cs:effectRef idx="0"/>
+    <cs:fontRef idx="minor">
+      <a:schemeClr val="tx1"/>
+    </cs:fontRef>
+    <cs:spPr>
+      <a:ln w="19050" cap="rnd">
+        <a:solidFill>
+          <a:schemeClr val="phClr"/>
+        </a:solidFill>
+        <a:prstDash val="sysDot"/>
+      </a:ln>
+    </cs:spPr>
+  </cs:trendline>
+  <cs:trendlineLabel>
+    <cs:lnRef idx="0"/>
+    <cs:fillRef idx="0"/>
+    <cs:effectRef idx="0"/>
+    <cs:fontRef idx="minor">
+      <a:schemeClr val="tx1">
+        <a:lumMod val="65000"/>
+        <a:lumOff val="35000"/>
+      </a:schemeClr>
+    </cs:fontRef>
+    <cs:defRPr sz="900" kern="1200"/>
+  </cs:trendlineLabel>
+  <cs:upBar>
+    <cs:lnRef idx="0"/>
+    <cs:fillRef idx="0"/>
+    <cs:effectRef idx="0"/>
+    <cs:fontRef idx="minor">
+      <a:schemeClr val="dk1"/>
+    </cs:fontRef>
+    <cs:spPr>
+      <a:solidFill>
+        <a:schemeClr val="lt1"/>
+      </a:solidFill>
+      <a:ln w="9525">
+        <a:solidFill>
+          <a:schemeClr val="tx1">
+            <a:lumMod val="15000"/>
+            <a:lumOff val="85000"/>
+          </a:schemeClr>
+        </a:solidFill>
+      </a:ln>
+    </cs:spPr>
+  </cs:upBar>
+  <cs:valueAxis>
+    <cs:lnRef idx="0"/>
+    <cs:fillRef idx="0"/>
+    <cs:effectRef idx="0"/>
+    <cs:fontRef idx="minor">
+      <a:schemeClr val="tx1">
+        <a:lumMod val="65000"/>
+        <a:lumOff val="35000"/>
+      </a:schemeClr>
+    </cs:fontRef>
+    <cs:defRPr sz="900" kern="1200"/>
+  </cs:valueAxis>
+  <cs:wall>
+    <cs:lnRef idx="0"/>
+    <cs:fillRef idx="0"/>
+    <cs:effectRef idx="0"/>
+    <cs:fontRef idx="minor">
+      <a:schemeClr val="tx1"/>
+    </cs:fontRef>
+    <cs:spPr>
+      <a:noFill/>
+      <a:ln>
+        <a:noFill/>
+      </a:ln>
+    </cs:spPr>
+  </cs:wall>
+</cs:chartStyle>
 </file>
 
 <file path=ppt/handoutMasters/handoutMaster1.xml><?xml version="1.0" encoding="utf-8"?>
@@ -5512,6 +8877,36 @@
                 </a:extLst>
               </a:tr>
             </a:tbl>
+          </a:graphicData>
+        </a:graphic>
+      </p:graphicFrame>
+      <p:graphicFrame>
+        <p:nvGraphicFramePr>
+          <p:cNvPr id="7" name="Diagramm 6">
+            <a:extLst>
+              <a:ext uri="{FF2B5EF4-FFF2-40B4-BE49-F238E27FC236}">
+                <a16:creationId xmlns:a16="http://schemas.microsoft.com/office/drawing/2014/main" id="{E1B304C6-0FCC-4903-9FD5-8C584426E2E6}"/>
+              </a:ext>
+            </a:extLst>
+          </p:cNvPr>
+          <p:cNvGraphicFramePr>
+            <a:graphicFrameLocks/>
+          </p:cNvGraphicFramePr>
+          <p:nvPr>
+            <p:extLst>
+              <p:ext uri="{D42A27DB-BD31-4B8C-83A1-F6EECF244321}">
+                <p14:modId xmlns:p14="http://schemas.microsoft.com/office/powerpoint/2010/main" val="2744347138"/>
+              </p:ext>
+            </p:extLst>
+          </p:nvPr>
+        </p:nvGraphicFramePr>
+        <p:xfrm>
+          <a:off x="3923928" y="1902653"/>
+          <a:ext cx="4536504" cy="2171700"/>
+        </p:xfrm>
+        <a:graphic>
+          <a:graphicData uri="http://schemas.openxmlformats.org/drawingml/2006/chart">
+            <c:chart xmlns:c="http://schemas.openxmlformats.org/drawingml/2006/chart" xmlns:r="http://schemas.openxmlformats.org/officeDocument/2006/relationships" r:id="rId2"/>
           </a:graphicData>
         </a:graphic>
       </p:graphicFrame>
@@ -6814,6 +10209,36 @@
           </a:graphicData>
         </a:graphic>
       </p:graphicFrame>
+      <p:graphicFrame>
+        <p:nvGraphicFramePr>
+          <p:cNvPr id="6" name="Diagramm 5">
+            <a:extLst>
+              <a:ext uri="{FF2B5EF4-FFF2-40B4-BE49-F238E27FC236}">
+                <a16:creationId xmlns:a16="http://schemas.microsoft.com/office/drawing/2014/main" id="{3CA4AE78-78FD-45B3-B0E7-A918E18FA25E}"/>
+              </a:ext>
+            </a:extLst>
+          </p:cNvPr>
+          <p:cNvGraphicFramePr>
+            <a:graphicFrameLocks/>
+          </p:cNvGraphicFramePr>
+          <p:nvPr>
+            <p:extLst>
+              <p:ext uri="{D42A27DB-BD31-4B8C-83A1-F6EECF244321}">
+                <p14:modId xmlns:p14="http://schemas.microsoft.com/office/powerpoint/2010/main" val="2943061526"/>
+              </p:ext>
+            </p:extLst>
+          </p:nvPr>
+        </p:nvGraphicFramePr>
+        <p:xfrm>
+          <a:off x="3923928" y="1902653"/>
+          <a:ext cx="4248472" cy="2171700"/>
+        </p:xfrm>
+        <a:graphic>
+          <a:graphicData uri="http://schemas.openxmlformats.org/drawingml/2006/chart">
+            <c:chart xmlns:c="http://schemas.openxmlformats.org/drawingml/2006/chart" xmlns:r="http://schemas.openxmlformats.org/officeDocument/2006/relationships" r:id="rId2"/>
+          </a:graphicData>
+        </a:graphic>
+      </p:graphicFrame>
     </p:spTree>
     <p:extLst>
       <p:ext uri="{BB962C8B-B14F-4D97-AF65-F5344CB8AC3E}">
@@ -7400,6 +10825,36 @@
           </a:graphicData>
         </a:graphic>
       </p:graphicFrame>
+      <p:graphicFrame>
+        <p:nvGraphicFramePr>
+          <p:cNvPr id="6" name="Diagramm 5">
+            <a:extLst>
+              <a:ext uri="{FF2B5EF4-FFF2-40B4-BE49-F238E27FC236}">
+                <a16:creationId xmlns:a16="http://schemas.microsoft.com/office/drawing/2014/main" id="{7F3E3105-0813-4029-B74B-AA841E032EF1}"/>
+              </a:ext>
+            </a:extLst>
+          </p:cNvPr>
+          <p:cNvGraphicFramePr>
+            <a:graphicFrameLocks/>
+          </p:cNvGraphicFramePr>
+          <p:nvPr>
+            <p:extLst>
+              <p:ext uri="{D42A27DB-BD31-4B8C-83A1-F6EECF244321}">
+                <p14:modId xmlns:p14="http://schemas.microsoft.com/office/powerpoint/2010/main" val="4255834580"/>
+              </p:ext>
+            </p:extLst>
+          </p:nvPr>
+        </p:nvGraphicFramePr>
+        <p:xfrm>
+          <a:off x="3851919" y="1902653"/>
+          <a:ext cx="4464497" cy="2171700"/>
+        </p:xfrm>
+        <a:graphic>
+          <a:graphicData uri="http://schemas.openxmlformats.org/drawingml/2006/chart">
+            <c:chart xmlns:c="http://schemas.openxmlformats.org/drawingml/2006/chart" xmlns:r="http://schemas.openxmlformats.org/officeDocument/2006/relationships" r:id="rId2"/>
+          </a:graphicData>
+        </a:graphic>
+      </p:graphicFrame>
     </p:spTree>
     <p:extLst>
       <p:ext uri="{BB962C8B-B14F-4D97-AF65-F5344CB8AC3E}">
@@ -7952,13 +11407,8 @@
             <a:pPr lvl="1"/>
             <a:r>
               <a:rPr lang="de-DE" dirty="0"/>
-              <a:t>Wie verwende ich ein Modell in R im </a:t>
-            </a:r>
-            <a:r>
-              <a:rPr lang="de-DE" dirty="0" err="1"/>
-              <a:t>SQLServer</a:t>
-            </a:r>
-            <a:endParaRPr lang="de-DE" dirty="0"/>
+              <a:t>Wie verwende ich ein Modell in R im SQL-Server</a:t>
+            </a:r>
           </a:p>
           <a:p>
             <a:r>
@@ -8032,13 +11482,8 @@
           <a:p>
             <a:r>
               <a:rPr lang="de-DE" dirty="0"/>
-              <a:t>Theorie zu R und </a:t>
-            </a:r>
-            <a:r>
-              <a:rPr lang="de-DE" dirty="0" err="1"/>
-              <a:t>SQLServer</a:t>
-            </a:r>
-            <a:endParaRPr lang="de-DE" dirty="0"/>
+              <a:t>Theorie zu R und SQL-Server</a:t>
+            </a:r>
           </a:p>
         </p:txBody>
       </p:sp>
@@ -9051,6 +12496,36 @@
                 </a:extLst>
               </a:tr>
             </a:tbl>
+          </a:graphicData>
+        </a:graphic>
+      </p:graphicFrame>
+      <p:graphicFrame>
+        <p:nvGraphicFramePr>
+          <p:cNvPr id="8" name="Diagramm 7">
+            <a:extLst>
+              <a:ext uri="{FF2B5EF4-FFF2-40B4-BE49-F238E27FC236}">
+                <a16:creationId xmlns:a16="http://schemas.microsoft.com/office/drawing/2014/main" id="{AF341009-5E0C-4085-971C-C28E6111D23E}"/>
+              </a:ext>
+            </a:extLst>
+          </p:cNvPr>
+          <p:cNvGraphicFramePr>
+            <a:graphicFrameLocks/>
+          </p:cNvGraphicFramePr>
+          <p:nvPr>
+            <p:extLst>
+              <p:ext uri="{D42A27DB-BD31-4B8C-83A1-F6EECF244321}">
+                <p14:modId xmlns:p14="http://schemas.microsoft.com/office/powerpoint/2010/main" val="2702464677"/>
+              </p:ext>
+            </p:extLst>
+          </p:nvPr>
+        </p:nvGraphicFramePr>
+        <p:xfrm>
+          <a:off x="3995936" y="1902653"/>
+          <a:ext cx="4320480" cy="2171700"/>
+        </p:xfrm>
+        <a:graphic>
+          <a:graphicData uri="http://schemas.openxmlformats.org/drawingml/2006/chart">
+            <c:chart xmlns:c="http://schemas.openxmlformats.org/drawingml/2006/chart" xmlns:r="http://schemas.openxmlformats.org/officeDocument/2006/relationships" r:id="rId2"/>
           </a:graphicData>
         </a:graphic>
       </p:graphicFrame>
@@ -9916,15 +13391,6 @@
 </file>
 
 <file path=customXml/item2.xml><?xml version="1.0" encoding="utf-8"?>
-<?mso-contentType ?>
-<FormTemplates xmlns="http://schemas.microsoft.com/sharepoint/v3/contenttype/forms">
-  <Display>DocumentLibraryForm</Display>
-  <Edit>DocumentLibraryForm</Edit>
-  <New>DocumentLibraryForm</New>
-</FormTemplates>
-</file>
-
-<file path=customXml/item3.xml><?xml version="1.0" encoding="utf-8"?>
 <ct:contentTypeSchema xmlns:ct="http://schemas.microsoft.com/office/2006/metadata/contentType" xmlns:ma="http://schemas.microsoft.com/office/2006/metadata/properties/metaAttributes" ct:_="" ma:_="" ma:contentTypeName="Document" ma:contentTypeID="0x0101007E5E5E72545FEE4EA413C9F33B92CDDC" ma:contentTypeVersion="1" ma:contentTypeDescription="Create a new document." ma:contentTypeScope="" ma:versionID="5fb799aac4c84f0a0e786f5b81ce7a3a">
   <xsd:schema xmlns:xsd="http://www.w3.org/2001/XMLSchema" xmlns:p="http://schemas.microsoft.com/office/2006/metadata/properties" xmlns:ns1="http://schemas.microsoft.com/sharepoint/v3" targetNamespace="http://schemas.microsoft.com/office/2006/metadata/properties" ma:root="true" ma:fieldsID="ddb0c952b897a810c8a4e377cff6bff8" ns1:_="">
     <xsd:import namespace="http://schemas.microsoft.com/sharepoint/v3"/>
@@ -9990,6 +13456,15 @@
 </ct:contentTypeSchema>
 </file>
 
+<file path=customXml/item3.xml><?xml version="1.0" encoding="utf-8"?>
+<?mso-contentType ?>
+<FormTemplates xmlns="http://schemas.microsoft.com/sharepoint/v3/contenttype/forms">
+  <Display>DocumentLibraryForm</Display>
+  <Edit>DocumentLibraryForm</Edit>
+  <New>DocumentLibraryForm</New>
+</FormTemplates>
+</file>
+
 <file path=customXml/itemProps1.xml><?xml version="1.0" encoding="utf-8"?>
 <ds:datastoreItem xmlns:ds="http://schemas.openxmlformats.org/officeDocument/2006/customXml" ds:itemID="{8D29B44A-4CF7-434C-A278-462478FDE8D7}">
   <ds:schemaRefs>
@@ -10006,14 +13481,6 @@
 </file>
 
 <file path=customXml/itemProps2.xml><?xml version="1.0" encoding="utf-8"?>
-<ds:datastoreItem xmlns:ds="http://schemas.openxmlformats.org/officeDocument/2006/customXml" ds:itemID="{066CE0DF-F14B-480E-8BB2-075A909740B9}">
-  <ds:schemaRefs>
-    <ds:schemaRef ds:uri="http://schemas.microsoft.com/sharepoint/v3/contenttype/forms"/>
-  </ds:schemaRefs>
-</ds:datastoreItem>
-</file>
-
-<file path=customXml/itemProps3.xml><?xml version="1.0" encoding="utf-8"?>
 <ds:datastoreItem xmlns:ds="http://schemas.openxmlformats.org/officeDocument/2006/customXml" ds:itemID="{7E02D938-E4F2-40AC-ABEF-165C072F9E88}">
   <ds:schemaRefs>
     <ds:schemaRef ds:uri="http://schemas.microsoft.com/office/2006/metadata/contentType"/>
@@ -10028,4 +13495,12 @@
     <ds:schemaRef ds:uri="http://schemas.microsoft.com/office/internal/2005/internalDocumentation"/>
   </ds:schemaRefs>
 </ds:datastoreItem>
+</file>
+
+<file path=customXml/itemProps3.xml><?xml version="1.0" encoding="utf-8"?>
+<ds:datastoreItem xmlns:ds="http://schemas.openxmlformats.org/officeDocument/2006/customXml" ds:itemID="{066CE0DF-F14B-480E-8BB2-075A909740B9}">
+  <ds:schemaRefs>
+    <ds:schemaRef ds:uri="http://schemas.microsoft.com/sharepoint/v3/contenttype/forms"/>
+  </ds:schemaRefs>
+</ds:datastoreItem>
 </file>
</xml_diff>

<commit_message>
Draft for UseCase TipPrediction and RateDetection
</commit_message>
<xml_diff>
--- a/Bachelor_Zwischenstand.pptx
+++ b/Bachelor_Zwischenstand.pptx
@@ -9313,14 +9313,14 @@
           <p:nvPr>
             <p:extLst>
               <p:ext uri="{D42A27DB-BD31-4B8C-83A1-F6EECF244321}">
-                <p14:modId xmlns:p14="http://schemas.microsoft.com/office/powerpoint/2010/main" val="2230315357"/>
+                <p14:modId xmlns:p14="http://schemas.microsoft.com/office/powerpoint/2010/main" val="364823906"/>
               </p:ext>
             </p:extLst>
           </p:nvPr>
         </p:nvGraphicFramePr>
         <p:xfrm>
-          <a:off x="262222" y="1902653"/>
-          <a:ext cx="3312368" cy="2171700"/>
+          <a:off x="179512" y="1902653"/>
+          <a:ext cx="3528392" cy="2312493"/>
         </p:xfrm>
         <a:graphic>
           <a:graphicData uri="http://schemas.openxmlformats.org/drawingml/2006/table">
@@ -9329,21 +9329,21 @@
                 <a:tableStyleId>{5C22544A-7EE6-4342-B048-85BDC9FD1C3A}</a:tableStyleId>
               </a:tblPr>
               <a:tblGrid>
-                <a:gridCol w="1242137">
+                <a:gridCol w="1323146">
                   <a:extLst>
                     <a:ext uri="{9D8B030D-6E8A-4147-A177-3AD203B41FA5}">
                       <a16:colId xmlns:a16="http://schemas.microsoft.com/office/drawing/2014/main" val="292505027"/>
                     </a:ext>
                   </a:extLst>
                 </a:gridCol>
-                <a:gridCol w="897101">
+                <a:gridCol w="955608">
                   <a:extLst>
                     <a:ext uri="{9D8B030D-6E8A-4147-A177-3AD203B41FA5}">
                       <a16:colId xmlns:a16="http://schemas.microsoft.com/office/drawing/2014/main" val="3445480926"/>
                     </a:ext>
                   </a:extLst>
                 </a:gridCol>
-                <a:gridCol w="1173130">
+                <a:gridCol w="1249638">
                   <a:extLst>
                     <a:ext uri="{9D8B030D-6E8A-4147-A177-3AD203B41FA5}">
                       <a16:colId xmlns:a16="http://schemas.microsoft.com/office/drawing/2014/main" val="2021208456"/>
@@ -9351,7 +9351,7 @@
                   </a:extLst>
                 </a:gridCol>
               </a:tblGrid>
-              <a:tr h="406442">
+              <a:tr h="552273">
                 <a:tc>
                   <a:txBody>
                     <a:bodyPr/>
@@ -9360,7 +9360,7 @@
                       <a:pPr algn="r"/>
                       <a:r>
                         <a:rPr lang="de-DE" sz="1050" dirty="0"/>
-                        <a:t>Eingabe</a:t>
+                        <a:t>Trainingsdaten</a:t>
                       </a:r>
                       <a:br>
                         <a:rPr lang="de-DE" sz="1050" dirty="0"/>
@@ -9408,7 +9408,7 @@
                   </a:ext>
                 </a:extLst>
               </a:tr>
-              <a:tr h="240256">
+              <a:tr h="243000">
                 <a:tc>
                   <a:txBody>
                     <a:bodyPr/>
@@ -9457,7 +9457,7 @@
                   </a:ext>
                 </a:extLst>
               </a:tr>
-              <a:tr h="240256">
+              <a:tr h="243000">
                 <a:tc>
                   <a:txBody>
                     <a:bodyPr/>
@@ -9506,7 +9506,7 @@
                   </a:ext>
                 </a:extLst>
               </a:tr>
-              <a:tr h="240256">
+              <a:tr h="243000">
                 <a:tc>
                   <a:txBody>
                     <a:bodyPr/>
@@ -9555,7 +9555,7 @@
                   </a:ext>
                 </a:extLst>
               </a:tr>
-              <a:tr h="240256">
+              <a:tr h="243000">
                 <a:tc>
                   <a:txBody>
                     <a:bodyPr/>
@@ -9604,7 +9604,7 @@
                   </a:ext>
                 </a:extLst>
               </a:tr>
-              <a:tr h="240256">
+              <a:tr h="243000">
                 <a:tc>
                   <a:txBody>
                     <a:bodyPr/>
@@ -9653,7 +9653,7 @@
                   </a:ext>
                 </a:extLst>
               </a:tr>
-              <a:tr h="240256">
+              <a:tr h="243000">
                 <a:tc>
                   <a:txBody>
                     <a:bodyPr/>
@@ -9702,7 +9702,7 @@
                   </a:ext>
                 </a:extLst>
               </a:tr>
-              <a:tr h="240256">
+              <a:tr h="243000">
                 <a:tc>
                   <a:txBody>
                     <a:bodyPr/>
@@ -9799,8 +9799,8 @@
         </p:nvSpPr>
         <p:spPr>
           <a:xfrm>
-            <a:off x="323528" y="4155926"/>
-            <a:ext cx="3251062" cy="432048"/>
+            <a:off x="323528" y="4299942"/>
+            <a:ext cx="3251062" cy="288032"/>
           </a:xfrm>
           <a:prstGeom prst="roundRect">
             <a:avLst/>
@@ -10007,14 +10007,14 @@
           <p:nvPr>
             <p:extLst>
               <p:ext uri="{D42A27DB-BD31-4B8C-83A1-F6EECF244321}">
-                <p14:modId xmlns:p14="http://schemas.microsoft.com/office/powerpoint/2010/main" val="3112393631"/>
+                <p14:modId xmlns:p14="http://schemas.microsoft.com/office/powerpoint/2010/main" val="623354550"/>
               </p:ext>
             </p:extLst>
           </p:nvPr>
         </p:nvGraphicFramePr>
         <p:xfrm>
-          <a:off x="262222" y="1902653"/>
-          <a:ext cx="3312368" cy="1668780"/>
+          <a:off x="107504" y="1902653"/>
+          <a:ext cx="3600399" cy="1668780"/>
         </p:xfrm>
         <a:graphic>
           <a:graphicData uri="http://schemas.openxmlformats.org/drawingml/2006/table">
@@ -10023,21 +10023,21 @@
                 <a:tableStyleId>{5C22544A-7EE6-4342-B048-85BDC9FD1C3A}</a:tableStyleId>
               </a:tblPr>
               <a:tblGrid>
-                <a:gridCol w="1242137">
+                <a:gridCol w="1350148">
                   <a:extLst>
                     <a:ext uri="{9D8B030D-6E8A-4147-A177-3AD203B41FA5}">
                       <a16:colId xmlns:a16="http://schemas.microsoft.com/office/drawing/2014/main" val="292505027"/>
                     </a:ext>
                   </a:extLst>
                 </a:gridCol>
-                <a:gridCol w="979409">
+                <a:gridCol w="1064575">
                   <a:extLst>
                     <a:ext uri="{9D8B030D-6E8A-4147-A177-3AD203B41FA5}">
                       <a16:colId xmlns:a16="http://schemas.microsoft.com/office/drawing/2014/main" val="3445480926"/>
                     </a:ext>
                   </a:extLst>
                 </a:gridCol>
-                <a:gridCol w="1090822">
+                <a:gridCol w="1185676">
                   <a:extLst>
                     <a:ext uri="{9D8B030D-6E8A-4147-A177-3AD203B41FA5}">
                       <a16:colId xmlns:a16="http://schemas.microsoft.com/office/drawing/2014/main" val="2021208456"/>
@@ -10054,7 +10054,7 @@
                       <a:pPr algn="r"/>
                       <a:r>
                         <a:rPr lang="de-DE" sz="1050" dirty="0"/>
-                        <a:t>Eingabe</a:t>
+                        <a:t>Trainingsdaten</a:t>
                       </a:r>
                       <a:br>
                         <a:rPr lang="de-DE" sz="1050" dirty="0"/>
@@ -10602,14 +10602,14 @@
           <p:nvPr>
             <p:extLst>
               <p:ext uri="{D42A27DB-BD31-4B8C-83A1-F6EECF244321}">
-                <p14:modId xmlns:p14="http://schemas.microsoft.com/office/powerpoint/2010/main" val="2775887143"/>
+                <p14:modId xmlns:p14="http://schemas.microsoft.com/office/powerpoint/2010/main" val="2121200507"/>
               </p:ext>
             </p:extLst>
           </p:nvPr>
         </p:nvGraphicFramePr>
         <p:xfrm>
-          <a:off x="262222" y="1902653"/>
-          <a:ext cx="3312368" cy="2171700"/>
+          <a:off x="107504" y="1902653"/>
+          <a:ext cx="3600400" cy="2171700"/>
         </p:xfrm>
         <a:graphic>
           <a:graphicData uri="http://schemas.openxmlformats.org/drawingml/2006/table">
@@ -10618,21 +10618,21 @@
                 <a:tableStyleId>{5C22544A-7EE6-4342-B048-85BDC9FD1C3A}</a:tableStyleId>
               </a:tblPr>
               <a:tblGrid>
-                <a:gridCol w="1242137">
+                <a:gridCol w="1350149">
                   <a:extLst>
                     <a:ext uri="{9D8B030D-6E8A-4147-A177-3AD203B41FA5}">
                       <a16:colId xmlns:a16="http://schemas.microsoft.com/office/drawing/2014/main" val="292505027"/>
                     </a:ext>
                   </a:extLst>
                 </a:gridCol>
-                <a:gridCol w="897101">
+                <a:gridCol w="975110">
                   <a:extLst>
                     <a:ext uri="{9D8B030D-6E8A-4147-A177-3AD203B41FA5}">
                       <a16:colId xmlns:a16="http://schemas.microsoft.com/office/drawing/2014/main" val="3445480926"/>
                     </a:ext>
                   </a:extLst>
                 </a:gridCol>
-                <a:gridCol w="1173130">
+                <a:gridCol w="1275141">
                   <a:extLst>
                     <a:ext uri="{9D8B030D-6E8A-4147-A177-3AD203B41FA5}">
                       <a16:colId xmlns:a16="http://schemas.microsoft.com/office/drawing/2014/main" val="2021208456"/>
@@ -10649,7 +10649,7 @@
                       <a:pPr algn="r"/>
                       <a:r>
                         <a:rPr lang="de-DE" sz="1050" dirty="0"/>
-                        <a:t>Eingabe</a:t>
+                        <a:t>Trainingsdaten</a:t>
                       </a:r>
                       <a:br>
                         <a:rPr lang="de-DE" sz="1050" dirty="0"/>
@@ -11237,14 +11237,14 @@
           <p:nvPr>
             <p:extLst>
               <p:ext uri="{D42A27DB-BD31-4B8C-83A1-F6EECF244321}">
-                <p14:modId xmlns:p14="http://schemas.microsoft.com/office/powerpoint/2010/main" val="2631197356"/>
+                <p14:modId xmlns:p14="http://schemas.microsoft.com/office/powerpoint/2010/main" val="2407506848"/>
               </p:ext>
             </p:extLst>
           </p:nvPr>
         </p:nvGraphicFramePr>
         <p:xfrm>
           <a:off x="262222" y="1902653"/>
-          <a:ext cx="3312368" cy="2171700"/>
+          <a:ext cx="3589698" cy="2171700"/>
         </p:xfrm>
         <a:graphic>
           <a:graphicData uri="http://schemas.openxmlformats.org/drawingml/2006/table">
@@ -11253,21 +11253,21 @@
                 <a:tableStyleId>{5C22544A-7EE6-4342-B048-85BDC9FD1C3A}</a:tableStyleId>
               </a:tblPr>
               <a:tblGrid>
-                <a:gridCol w="1242137">
+                <a:gridCol w="1346136">
                   <a:extLst>
                     <a:ext uri="{9D8B030D-6E8A-4147-A177-3AD203B41FA5}">
                       <a16:colId xmlns:a16="http://schemas.microsoft.com/office/drawing/2014/main" val="292505027"/>
                     </a:ext>
                   </a:extLst>
                 </a:gridCol>
-                <a:gridCol w="897101">
+                <a:gridCol w="972211">
                   <a:extLst>
                     <a:ext uri="{9D8B030D-6E8A-4147-A177-3AD203B41FA5}">
                       <a16:colId xmlns:a16="http://schemas.microsoft.com/office/drawing/2014/main" val="3445480926"/>
                     </a:ext>
                   </a:extLst>
                 </a:gridCol>
-                <a:gridCol w="1173130">
+                <a:gridCol w="1271351">
                   <a:extLst>
                     <a:ext uri="{9D8B030D-6E8A-4147-A177-3AD203B41FA5}">
                       <a16:colId xmlns:a16="http://schemas.microsoft.com/office/drawing/2014/main" val="2021208456"/>
@@ -11284,7 +11284,7 @@
                       <a:pPr algn="r"/>
                       <a:r>
                         <a:rPr lang="de-DE" sz="1050" dirty="0"/>
-                        <a:t>Eingabe</a:t>
+                        <a:t>Trainingsdaten</a:t>
                       </a:r>
                       <a:br>
                         <a:rPr lang="de-DE" sz="1050" dirty="0"/>
@@ -11939,14 +11939,14 @@
           <p:nvPr>
             <p:extLst>
               <p:ext uri="{D42A27DB-BD31-4B8C-83A1-F6EECF244321}">
-                <p14:modId xmlns:p14="http://schemas.microsoft.com/office/powerpoint/2010/main" val="3482538119"/>
+                <p14:modId xmlns:p14="http://schemas.microsoft.com/office/powerpoint/2010/main" val="3727108045"/>
               </p:ext>
             </p:extLst>
           </p:nvPr>
         </p:nvGraphicFramePr>
         <p:xfrm>
           <a:off x="262222" y="1902653"/>
-          <a:ext cx="3312368" cy="2171700"/>
+          <a:ext cx="3517690" cy="2171700"/>
         </p:xfrm>
         <a:graphic>
           <a:graphicData uri="http://schemas.openxmlformats.org/drawingml/2006/table">
@@ -11955,21 +11955,21 @@
                 <a:tableStyleId>{5C22544A-7EE6-4342-B048-85BDC9FD1C3A}</a:tableStyleId>
               </a:tblPr>
               <a:tblGrid>
-                <a:gridCol w="1242137">
+                <a:gridCol w="1319133">
                   <a:extLst>
                     <a:ext uri="{9D8B030D-6E8A-4147-A177-3AD203B41FA5}">
                       <a16:colId xmlns:a16="http://schemas.microsoft.com/office/drawing/2014/main" val="292505027"/>
                     </a:ext>
                   </a:extLst>
                 </a:gridCol>
-                <a:gridCol w="897101">
+                <a:gridCol w="952709">
                   <a:extLst>
                     <a:ext uri="{9D8B030D-6E8A-4147-A177-3AD203B41FA5}">
                       <a16:colId xmlns:a16="http://schemas.microsoft.com/office/drawing/2014/main" val="3445480926"/>
                     </a:ext>
                   </a:extLst>
                 </a:gridCol>
-                <a:gridCol w="1173130">
+                <a:gridCol w="1245848">
                   <a:extLst>
                     <a:ext uri="{9D8B030D-6E8A-4147-A177-3AD203B41FA5}">
                       <a16:colId xmlns:a16="http://schemas.microsoft.com/office/drawing/2014/main" val="2021208456"/>
@@ -11986,7 +11986,7 @@
                       <a:pPr algn="r"/>
                       <a:r>
                         <a:rPr lang="de-DE" sz="1050" dirty="0"/>
-                        <a:t>Eingabe</a:t>
+                        <a:t>Trainingsdaten</a:t>
                       </a:r>
                       <a:br>
                         <a:rPr lang="de-DE" sz="1050" dirty="0"/>
@@ -13850,14 +13850,14 @@
           <p:nvPr>
             <p:extLst>
               <p:ext uri="{D42A27DB-BD31-4B8C-83A1-F6EECF244321}">
-                <p14:modId xmlns:p14="http://schemas.microsoft.com/office/powerpoint/2010/main" val="1675825305"/>
+                <p14:modId xmlns:p14="http://schemas.microsoft.com/office/powerpoint/2010/main" val="758846376"/>
               </p:ext>
             </p:extLst>
           </p:nvPr>
         </p:nvGraphicFramePr>
         <p:xfrm>
-          <a:off x="262222" y="1902653"/>
-          <a:ext cx="3312368" cy="2171700"/>
+          <a:off x="35496" y="1902653"/>
+          <a:ext cx="3539093" cy="2171700"/>
         </p:xfrm>
         <a:graphic>
           <a:graphicData uri="http://schemas.openxmlformats.org/drawingml/2006/table">
@@ -13866,21 +13866,21 @@
                 <a:tableStyleId>{5C22544A-7EE6-4342-B048-85BDC9FD1C3A}</a:tableStyleId>
               </a:tblPr>
               <a:tblGrid>
-                <a:gridCol w="1242137">
+                <a:gridCol w="1327159">
                   <a:extLst>
                     <a:ext uri="{9D8B030D-6E8A-4147-A177-3AD203B41FA5}">
                       <a16:colId xmlns:a16="http://schemas.microsoft.com/office/drawing/2014/main" val="292505027"/>
                     </a:ext>
                   </a:extLst>
                 </a:gridCol>
-                <a:gridCol w="897101">
+                <a:gridCol w="958505">
                   <a:extLst>
                     <a:ext uri="{9D8B030D-6E8A-4147-A177-3AD203B41FA5}">
                       <a16:colId xmlns:a16="http://schemas.microsoft.com/office/drawing/2014/main" val="3445480926"/>
                     </a:ext>
                   </a:extLst>
                 </a:gridCol>
-                <a:gridCol w="1173130">
+                <a:gridCol w="1253429">
                   <a:extLst>
                     <a:ext uri="{9D8B030D-6E8A-4147-A177-3AD203B41FA5}">
                       <a16:colId xmlns:a16="http://schemas.microsoft.com/office/drawing/2014/main" val="2021208456"/>
@@ -13897,7 +13897,7 @@
                       <a:pPr algn="r"/>
                       <a:r>
                         <a:rPr lang="de-DE" sz="1050" dirty="0"/>
-                        <a:t>Eingabe</a:t>
+                        <a:t>Trainingsdaten</a:t>
                       </a:r>
                       <a:br>
                         <a:rPr lang="de-DE" sz="1050" dirty="0"/>
@@ -15174,21 +15174,21 @@
 </file>
 
 <file path=customXml/item1.xml><?xml version="1.0" encoding="utf-8"?>
+<p:properties xmlns:p="http://schemas.microsoft.com/office/2006/metadata/properties" xmlns:xsi="http://www.w3.org/2001/XMLSchema-instance">
+  <documentManagement>
+    <PublishingExpirationDate xmlns="http://schemas.microsoft.com/sharepoint/v3" xsi:nil="true"/>
+    <PublishingStartDate xmlns="http://schemas.microsoft.com/sharepoint/v3" xsi:nil="true"/>
+  </documentManagement>
+</p:properties>
+</file>
+
+<file path=customXml/item2.xml><?xml version="1.0" encoding="utf-8"?>
 <?mso-contentType ?>
 <FormTemplates xmlns="http://schemas.microsoft.com/sharepoint/v3/contenttype/forms">
   <Display>DocumentLibraryForm</Display>
   <Edit>DocumentLibraryForm</Edit>
   <New>DocumentLibraryForm</New>
 </FormTemplates>
-</file>
-
-<file path=customXml/item2.xml><?xml version="1.0" encoding="utf-8"?>
-<p:properties xmlns:p="http://schemas.microsoft.com/office/2006/metadata/properties" xmlns:xsi="http://www.w3.org/2001/XMLSchema-instance">
-  <documentManagement>
-    <PublishingExpirationDate xmlns="http://schemas.microsoft.com/sharepoint/v3" xsi:nil="true"/>
-    <PublishingStartDate xmlns="http://schemas.microsoft.com/sharepoint/v3" xsi:nil="true"/>
-  </documentManagement>
-</p:properties>
 </file>
 
 <file path=customXml/item3.xml><?xml version="1.0" encoding="utf-8"?>
@@ -15258,14 +15258,6 @@
 </file>
 
 <file path=customXml/itemProps1.xml><?xml version="1.0" encoding="utf-8"?>
-<ds:datastoreItem xmlns:ds="http://schemas.openxmlformats.org/officeDocument/2006/customXml" ds:itemID="{066CE0DF-F14B-480E-8BB2-075A909740B9}">
-  <ds:schemaRefs>
-    <ds:schemaRef ds:uri="http://schemas.microsoft.com/sharepoint/v3/contenttype/forms"/>
-  </ds:schemaRefs>
-</ds:datastoreItem>
-</file>
-
-<file path=customXml/itemProps2.xml><?xml version="1.0" encoding="utf-8"?>
 <ds:datastoreItem xmlns:ds="http://schemas.openxmlformats.org/officeDocument/2006/customXml" ds:itemID="{8D29B44A-4CF7-434C-A278-462478FDE8D7}">
   <ds:schemaRefs>
     <ds:schemaRef ds:uri="http://schemas.microsoft.com/office/2006/metadata/properties"/>
@@ -15276,6 +15268,14 @@
     <ds:schemaRef ds:uri="http://schemas.openxmlformats.org/package/2006/metadata/core-properties"/>
     <ds:schemaRef ds:uri="http://schemas.microsoft.com/sharepoint/v3"/>
     <ds:schemaRef ds:uri="http://purl.org/dc/terms/"/>
+  </ds:schemaRefs>
+</ds:datastoreItem>
+</file>
+
+<file path=customXml/itemProps2.xml><?xml version="1.0" encoding="utf-8"?>
+<ds:datastoreItem xmlns:ds="http://schemas.openxmlformats.org/officeDocument/2006/customXml" ds:itemID="{066CE0DF-F14B-480E-8BB2-075A909740B9}">
+  <ds:schemaRefs>
+    <ds:schemaRef ds:uri="http://schemas.microsoft.com/sharepoint/v3/contenttype/forms"/>
   </ds:schemaRefs>
 </ds:datastoreItem>
 </file>

</xml_diff>

<commit_message>
all Screenshots from Presentation taken
</commit_message>
<xml_diff>
--- a/Bachelor_Zwischenstand.pptx
+++ b/Bachelor_Zwischenstand.pptx
@@ -9313,14 +9313,14 @@
           <p:nvPr>
             <p:extLst>
               <p:ext uri="{D42A27DB-BD31-4B8C-83A1-F6EECF244321}">
-                <p14:modId xmlns:p14="http://schemas.microsoft.com/office/powerpoint/2010/main" val="364823906"/>
+                <p14:modId xmlns:p14="http://schemas.microsoft.com/office/powerpoint/2010/main" val="171039580"/>
               </p:ext>
             </p:extLst>
           </p:nvPr>
         </p:nvGraphicFramePr>
         <p:xfrm>
-          <a:off x="179512" y="1902653"/>
-          <a:ext cx="3528392" cy="2312493"/>
+          <a:off x="184863" y="1995075"/>
+          <a:ext cx="3528392" cy="2061033"/>
         </p:xfrm>
         <a:graphic>
           <a:graphicData uri="http://schemas.openxmlformats.org/drawingml/2006/table">
@@ -9380,10 +9380,9 @@
                     <a:p>
                       <a:pPr algn="r"/>
                       <a:r>
-                        <a:rPr lang="de-DE" sz="1050" dirty="0" err="1"/>
+                        <a:rPr lang="de-DE" sz="1050" dirty="0"/>
                         <a:t>Accuracy</a:t>
                       </a:r>
-                      <a:endParaRPr lang="de-DE" sz="1050" dirty="0"/>
                     </a:p>
                   </a:txBody>
                   <a:tcPr/>
@@ -9702,55 +9701,6 @@
                   </a:ext>
                 </a:extLst>
               </a:tr>
-              <a:tr h="243000">
-                <a:tc>
-                  <a:txBody>
-                    <a:bodyPr/>
-                    <a:lstStyle/>
-                    <a:p>
-                      <a:pPr algn="r"/>
-                      <a:r>
-                        <a:rPr lang="de-DE" sz="1050" dirty="0"/>
-                        <a:t>1000</a:t>
-                      </a:r>
-                    </a:p>
-                  </a:txBody>
-                  <a:tcPr/>
-                </a:tc>
-                <a:tc>
-                  <a:txBody>
-                    <a:bodyPr/>
-                    <a:lstStyle/>
-                    <a:p>
-                      <a:pPr algn="r"/>
-                      <a:r>
-                        <a:rPr lang="de-DE" sz="1050" dirty="0"/>
-                        <a:t>-</a:t>
-                      </a:r>
-                    </a:p>
-                  </a:txBody>
-                  <a:tcPr/>
-                </a:tc>
-                <a:tc>
-                  <a:txBody>
-                    <a:bodyPr/>
-                    <a:lstStyle/>
-                    <a:p>
-                      <a:pPr algn="r"/>
-                      <a:r>
-                        <a:rPr lang="de-DE" sz="1050" dirty="0"/>
-                        <a:t>-</a:t>
-                      </a:r>
-                    </a:p>
-                  </a:txBody>
-                  <a:tcPr/>
-                </a:tc>
-                <a:extLst>
-                  <a:ext uri="{0D108BD9-81ED-4DB2-BD59-A6C34878D82A}">
-                    <a16:rowId xmlns:a16="http://schemas.microsoft.com/office/drawing/2014/main" val="4046004130"/>
-                  </a:ext>
-                </a:extLst>
-              </a:tr>
             </a:tbl>
           </a:graphicData>
         </a:graphic>
@@ -10074,10 +10024,9 @@
                     <a:p>
                       <a:pPr algn="r"/>
                       <a:r>
-                        <a:rPr lang="de-DE" sz="1050" dirty="0" err="1"/>
+                        <a:rPr lang="de-DE" sz="1050" dirty="0"/>
                         <a:t>Accuracy</a:t>
                       </a:r>
-                      <a:endParaRPr lang="de-DE" sz="1050" dirty="0"/>
                     </a:p>
                   </a:txBody>
                   <a:tcPr/>
@@ -15174,21 +15123,21 @@
 </file>
 
 <file path=customXml/item1.xml><?xml version="1.0" encoding="utf-8"?>
+<?mso-contentType ?>
+<FormTemplates xmlns="http://schemas.microsoft.com/sharepoint/v3/contenttype/forms">
+  <Display>DocumentLibraryForm</Display>
+  <Edit>DocumentLibraryForm</Edit>
+  <New>DocumentLibraryForm</New>
+</FormTemplates>
+</file>
+
+<file path=customXml/item2.xml><?xml version="1.0" encoding="utf-8"?>
 <p:properties xmlns:p="http://schemas.microsoft.com/office/2006/metadata/properties" xmlns:xsi="http://www.w3.org/2001/XMLSchema-instance">
   <documentManagement>
     <PublishingExpirationDate xmlns="http://schemas.microsoft.com/sharepoint/v3" xsi:nil="true"/>
     <PublishingStartDate xmlns="http://schemas.microsoft.com/sharepoint/v3" xsi:nil="true"/>
   </documentManagement>
 </p:properties>
-</file>
-
-<file path=customXml/item2.xml><?xml version="1.0" encoding="utf-8"?>
-<?mso-contentType ?>
-<FormTemplates xmlns="http://schemas.microsoft.com/sharepoint/v3/contenttype/forms">
-  <Display>DocumentLibraryForm</Display>
-  <Edit>DocumentLibraryForm</Edit>
-  <New>DocumentLibraryForm</New>
-</FormTemplates>
 </file>
 
 <file path=customXml/item3.xml><?xml version="1.0" encoding="utf-8"?>
@@ -15258,6 +15207,14 @@
 </file>
 
 <file path=customXml/itemProps1.xml><?xml version="1.0" encoding="utf-8"?>
+<ds:datastoreItem xmlns:ds="http://schemas.openxmlformats.org/officeDocument/2006/customXml" ds:itemID="{066CE0DF-F14B-480E-8BB2-075A909740B9}">
+  <ds:schemaRefs>
+    <ds:schemaRef ds:uri="http://schemas.microsoft.com/sharepoint/v3/contenttype/forms"/>
+  </ds:schemaRefs>
+</ds:datastoreItem>
+</file>
+
+<file path=customXml/itemProps2.xml><?xml version="1.0" encoding="utf-8"?>
 <ds:datastoreItem xmlns:ds="http://schemas.openxmlformats.org/officeDocument/2006/customXml" ds:itemID="{8D29B44A-4CF7-434C-A278-462478FDE8D7}">
   <ds:schemaRefs>
     <ds:schemaRef ds:uri="http://schemas.microsoft.com/office/2006/metadata/properties"/>
@@ -15268,14 +15225,6 @@
     <ds:schemaRef ds:uri="http://schemas.openxmlformats.org/package/2006/metadata/core-properties"/>
     <ds:schemaRef ds:uri="http://schemas.microsoft.com/sharepoint/v3"/>
     <ds:schemaRef ds:uri="http://purl.org/dc/terms/"/>
-  </ds:schemaRefs>
-</ds:datastoreItem>
-</file>
-
-<file path=customXml/itemProps2.xml><?xml version="1.0" encoding="utf-8"?>
-<ds:datastoreItem xmlns:ds="http://schemas.openxmlformats.org/officeDocument/2006/customXml" ds:itemID="{066CE0DF-F14B-480E-8BB2-075A909740B9}">
-  <ds:schemaRefs>
-    <ds:schemaRef ds:uri="http://schemas.microsoft.com/sharepoint/v3/contenttype/forms"/>
   </ds:schemaRefs>
 </ds:datastoreItem>
 </file>

</xml_diff>